<commit_message>
latest files - including javafx
</commit_message>
<xml_diff>
--- a/Trainer_KickOff_JUMP_2.0.pptx
+++ b/Trainer_KickOff_JUMP_2.0.pptx
@@ -13,11 +13,12 @@
     <p:sldId id="260" r:id="rId7"/>
     <p:sldId id="272" r:id="rId8"/>
     <p:sldId id="266" r:id="rId9"/>
-    <p:sldId id="267" r:id="rId10"/>
-    <p:sldId id="268" r:id="rId11"/>
-    <p:sldId id="269" r:id="rId12"/>
-    <p:sldId id="270" r:id="rId13"/>
-    <p:sldId id="271" r:id="rId14"/>
+    <p:sldId id="273" r:id="rId10"/>
+    <p:sldId id="267" r:id="rId11"/>
+    <p:sldId id="268" r:id="rId12"/>
+    <p:sldId id="269" r:id="rId13"/>
+    <p:sldId id="270" r:id="rId14"/>
+    <p:sldId id="271" r:id="rId15"/>
   </p:sldIdLst>
   <p:sldSz cx="12192000" cy="6858000"/>
   <p:notesSz cx="6858000" cy="9144000"/>
@@ -255,7 +256,7 @@
           <a:p>
             <a:fld id="{49CA1D39-8E67-4B75-A3FB-7696D106E967}" type="datetimeFigureOut">
               <a:rPr lang="en-US" smtClean="0"/>
-              <a:t>6/19/2019</a:t>
+              <a:t>7/24/2019</a:t>
             </a:fld>
             <a:endParaRPr lang="en-US"/>
           </a:p>
@@ -425,7 +426,7 @@
           <a:p>
             <a:fld id="{49CA1D39-8E67-4B75-A3FB-7696D106E967}" type="datetimeFigureOut">
               <a:rPr lang="en-US" smtClean="0"/>
-              <a:t>6/19/2019</a:t>
+              <a:t>7/24/2019</a:t>
             </a:fld>
             <a:endParaRPr lang="en-US"/>
           </a:p>
@@ -605,7 +606,7 @@
           <a:p>
             <a:fld id="{49CA1D39-8E67-4B75-A3FB-7696D106E967}" type="datetimeFigureOut">
               <a:rPr lang="en-US" smtClean="0"/>
-              <a:t>6/19/2019</a:t>
+              <a:t>7/24/2019</a:t>
             </a:fld>
             <a:endParaRPr lang="en-US"/>
           </a:p>
@@ -775,7 +776,7 @@
           <a:p>
             <a:fld id="{49CA1D39-8E67-4B75-A3FB-7696D106E967}" type="datetimeFigureOut">
               <a:rPr lang="en-US" smtClean="0"/>
-              <a:t>6/19/2019</a:t>
+              <a:t>7/24/2019</a:t>
             </a:fld>
             <a:endParaRPr lang="en-US"/>
           </a:p>
@@ -1021,7 +1022,7 @@
           <a:p>
             <a:fld id="{49CA1D39-8E67-4B75-A3FB-7696D106E967}" type="datetimeFigureOut">
               <a:rPr lang="en-US" smtClean="0"/>
-              <a:t>6/19/2019</a:t>
+              <a:t>7/24/2019</a:t>
             </a:fld>
             <a:endParaRPr lang="en-US"/>
           </a:p>
@@ -1253,7 +1254,7 @@
           <a:p>
             <a:fld id="{49CA1D39-8E67-4B75-A3FB-7696D106E967}" type="datetimeFigureOut">
               <a:rPr lang="en-US" smtClean="0"/>
-              <a:t>6/19/2019</a:t>
+              <a:t>7/24/2019</a:t>
             </a:fld>
             <a:endParaRPr lang="en-US"/>
           </a:p>
@@ -1620,7 +1621,7 @@
           <a:p>
             <a:fld id="{49CA1D39-8E67-4B75-A3FB-7696D106E967}" type="datetimeFigureOut">
               <a:rPr lang="en-US" smtClean="0"/>
-              <a:t>6/19/2019</a:t>
+              <a:t>7/24/2019</a:t>
             </a:fld>
             <a:endParaRPr lang="en-US"/>
           </a:p>
@@ -1738,7 +1739,7 @@
           <a:p>
             <a:fld id="{49CA1D39-8E67-4B75-A3FB-7696D106E967}" type="datetimeFigureOut">
               <a:rPr lang="en-US" smtClean="0"/>
-              <a:t>6/19/2019</a:t>
+              <a:t>7/24/2019</a:t>
             </a:fld>
             <a:endParaRPr lang="en-US"/>
           </a:p>
@@ -1833,7 +1834,7 @@
           <a:p>
             <a:fld id="{49CA1D39-8E67-4B75-A3FB-7696D106E967}" type="datetimeFigureOut">
               <a:rPr lang="en-US" smtClean="0"/>
-              <a:t>6/19/2019</a:t>
+              <a:t>7/24/2019</a:t>
             </a:fld>
             <a:endParaRPr lang="en-US"/>
           </a:p>
@@ -2110,7 +2111,7 @@
           <a:p>
             <a:fld id="{49CA1D39-8E67-4B75-A3FB-7696D106E967}" type="datetimeFigureOut">
               <a:rPr lang="en-US" smtClean="0"/>
-              <a:t>6/19/2019</a:t>
+              <a:t>7/24/2019</a:t>
             </a:fld>
             <a:endParaRPr lang="en-US"/>
           </a:p>
@@ -2363,7 +2364,7 @@
           <a:p>
             <a:fld id="{49CA1D39-8E67-4B75-A3FB-7696D106E967}" type="datetimeFigureOut">
               <a:rPr lang="en-US" smtClean="0"/>
-              <a:t>6/19/2019</a:t>
+              <a:t>7/24/2019</a:t>
             </a:fld>
             <a:endParaRPr lang="en-US"/>
           </a:p>
@@ -2576,7 +2577,7 @@
           <a:p>
             <a:fld id="{49CA1D39-8E67-4B75-A3FB-7696D106E967}" type="datetimeFigureOut">
               <a:rPr lang="en-US" smtClean="0"/>
-              <a:t>6/19/2019</a:t>
+              <a:t>7/24/2019</a:t>
             </a:fld>
             <a:endParaRPr lang="en-US"/>
           </a:p>
@@ -3064,11 +3065,7 @@
           <a:p>
             <a:r>
               <a:rPr lang="en-US" b="1" dirty="0" smtClean="0"/>
-              <a:t>Trainer: Claude </a:t>
-            </a:r>
-            <a:r>
-              <a:rPr lang="en-US" b="1" dirty="0" smtClean="0"/>
-              <a:t>Gauthier</a:t>
+              <a:t>Trainer: Claude Gauthier</a:t>
             </a:r>
           </a:p>
           <a:p>
@@ -3161,6 +3158,110 @@
 </file>
 
 <file path=ppt/slides/slide10.xml><?xml version="1.0" encoding="utf-8"?>
+<p:sld xmlns:a="http://schemas.openxmlformats.org/drawingml/2006/main" xmlns:r="http://schemas.openxmlformats.org/officeDocument/2006/relationships" xmlns:p="http://schemas.openxmlformats.org/presentationml/2006/main">
+  <p:cSld>
+    <p:spTree>
+      <p:nvGrpSpPr>
+        <p:cNvPr id="1" name=""/>
+        <p:cNvGrpSpPr/>
+        <p:nvPr/>
+      </p:nvGrpSpPr>
+      <p:grpSpPr>
+        <a:xfrm>
+          <a:off x="0" y="0"/>
+          <a:ext cx="0" cy="0"/>
+          <a:chOff x="0" y="0"/>
+          <a:chExt cx="0" cy="0"/>
+        </a:xfrm>
+      </p:grpSpPr>
+      <p:sp>
+        <p:nvSpPr>
+          <p:cNvPr id="2" name="Title 1"/>
+          <p:cNvSpPr>
+            <a:spLocks noGrp="1"/>
+          </p:cNvSpPr>
+          <p:nvPr>
+            <p:ph type="title"/>
+          </p:nvPr>
+        </p:nvSpPr>
+        <p:spPr/>
+        <p:txBody>
+          <a:bodyPr/>
+          <a:lstStyle/>
+          <a:p>
+            <a:r>
+              <a:rPr lang="en-US" dirty="0"/>
+              <a:t>Skills Level (definitions)</a:t>
+            </a:r>
+          </a:p>
+        </p:txBody>
+      </p:sp>
+      <p:sp>
+        <p:nvSpPr>
+          <p:cNvPr id="3" name="Content Placeholder 2"/>
+          <p:cNvSpPr>
+            <a:spLocks noGrp="1"/>
+          </p:cNvSpPr>
+          <p:nvPr>
+            <p:ph idx="1"/>
+          </p:nvPr>
+        </p:nvSpPr>
+        <p:spPr>
+          <a:xfrm>
+            <a:off x="838200" y="1825625"/>
+            <a:ext cx="10515600" cy="2832100"/>
+          </a:xfrm>
+        </p:spPr>
+        <p:txBody>
+          <a:bodyPr/>
+          <a:lstStyle/>
+          <a:p>
+            <a:r>
+              <a:rPr lang="en-US" dirty="0" smtClean="0"/>
+              <a:t>Fundamental: basic knowledge</a:t>
+            </a:r>
+          </a:p>
+          <a:p>
+            <a:r>
+              <a:rPr lang="en-US" dirty="0" smtClean="0"/>
+              <a:t>Novice: limited experience</a:t>
+            </a:r>
+          </a:p>
+          <a:p>
+            <a:r>
+              <a:rPr lang="en-US" dirty="0" smtClean="0"/>
+              <a:t>Intermediate: practical application</a:t>
+            </a:r>
+          </a:p>
+          <a:p>
+            <a:r>
+              <a:rPr lang="en-US" dirty="0" smtClean="0"/>
+              <a:t>Advanced: applied theory</a:t>
+            </a:r>
+          </a:p>
+          <a:p>
+            <a:r>
+              <a:rPr lang="en-US" dirty="0" smtClean="0"/>
+              <a:t>Expert: recognized authority</a:t>
+            </a:r>
+            <a:endParaRPr lang="en-US" dirty="0"/>
+          </a:p>
+        </p:txBody>
+      </p:sp>
+    </p:spTree>
+    <p:extLst>
+      <p:ext uri="{BB962C8B-B14F-4D97-AF65-F5344CB8AC3E}">
+        <p14:creationId xmlns:p14="http://schemas.microsoft.com/office/powerpoint/2010/main" val="4184816593"/>
+      </p:ext>
+    </p:extLst>
+  </p:cSld>
+  <p:clrMapOvr>
+    <a:masterClrMapping/>
+  </p:clrMapOvr>
+</p:sld>
+</file>
+
+<file path=ppt/slides/slide11.xml><?xml version="1.0" encoding="utf-8"?>
 <p:sld xmlns:a="http://schemas.openxmlformats.org/drawingml/2006/main" xmlns:r="http://schemas.openxmlformats.org/officeDocument/2006/relationships" xmlns:p="http://schemas.openxmlformats.org/presentationml/2006/main">
   <p:cSld>
     <p:spTree>
@@ -3902,166 +4003,6 @@
 </p:sld>
 </file>
 
-<file path=ppt/slides/slide11.xml><?xml version="1.0" encoding="utf-8"?>
-<p:sld xmlns:a="http://schemas.openxmlformats.org/drawingml/2006/main" xmlns:r="http://schemas.openxmlformats.org/officeDocument/2006/relationships" xmlns:p="http://schemas.openxmlformats.org/presentationml/2006/main">
-  <p:cSld>
-    <p:spTree>
-      <p:nvGrpSpPr>
-        <p:cNvPr id="1" name=""/>
-        <p:cNvGrpSpPr/>
-        <p:nvPr/>
-      </p:nvGrpSpPr>
-      <p:grpSpPr>
-        <a:xfrm>
-          <a:off x="0" y="0"/>
-          <a:ext cx="0" cy="0"/>
-          <a:chOff x="0" y="0"/>
-          <a:chExt cx="0" cy="0"/>
-        </a:xfrm>
-      </p:grpSpPr>
-      <p:sp>
-        <p:nvSpPr>
-          <p:cNvPr id="2" name="Title 1"/>
-          <p:cNvSpPr>
-            <a:spLocks noGrp="1"/>
-          </p:cNvSpPr>
-          <p:nvPr>
-            <p:ph type="title"/>
-          </p:nvPr>
-        </p:nvSpPr>
-        <p:spPr/>
-        <p:txBody>
-          <a:bodyPr/>
-          <a:lstStyle/>
-          <a:p>
-            <a:r>
-              <a:rPr lang="en-US" dirty="0" smtClean="0"/>
-              <a:t>Overall Expectations</a:t>
-            </a:r>
-            <a:endParaRPr lang="en-US" dirty="0"/>
-          </a:p>
-        </p:txBody>
-      </p:sp>
-      <p:sp>
-        <p:nvSpPr>
-          <p:cNvPr id="3" name="Content Placeholder 2"/>
-          <p:cNvSpPr>
-            <a:spLocks noGrp="1"/>
-          </p:cNvSpPr>
-          <p:nvPr>
-            <p:ph idx="1"/>
-          </p:nvPr>
-        </p:nvSpPr>
-        <p:spPr/>
-        <p:txBody>
-          <a:bodyPr/>
-          <a:lstStyle/>
-          <a:p>
-            <a:r>
-              <a:rPr lang="en-US" dirty="0"/>
-              <a:t>The expectations in this training is to create Java full stack developers with </a:t>
-            </a:r>
-            <a:r>
-              <a:rPr lang="en-US" dirty="0" smtClean="0"/>
-              <a:t>about:</a:t>
-            </a:r>
-          </a:p>
-          <a:p>
-            <a:pPr lvl="1"/>
-            <a:r>
-              <a:rPr lang="en-US" dirty="0" smtClean="0"/>
-              <a:t>70</a:t>
-            </a:r>
-            <a:r>
-              <a:rPr lang="en-US" dirty="0"/>
-              <a:t>% service knowledge, </a:t>
-            </a:r>
-            <a:endParaRPr lang="en-US" dirty="0" smtClean="0"/>
-          </a:p>
-          <a:p>
-            <a:pPr lvl="1"/>
-            <a:r>
-              <a:rPr lang="en-US" dirty="0" smtClean="0"/>
-              <a:t>25% </a:t>
-            </a:r>
-            <a:r>
-              <a:rPr lang="en-US" dirty="0"/>
-              <a:t>front-end </a:t>
-            </a:r>
-            <a:r>
-              <a:rPr lang="en-US" dirty="0" smtClean="0"/>
-              <a:t>knowledge, </a:t>
-            </a:r>
-            <a:r>
-              <a:rPr lang="en-US" dirty="0"/>
-              <a:t>and </a:t>
-            </a:r>
-            <a:endParaRPr lang="en-US" dirty="0" smtClean="0"/>
-          </a:p>
-          <a:p>
-            <a:pPr lvl="1"/>
-            <a:r>
-              <a:rPr lang="en-US" dirty="0" smtClean="0"/>
-              <a:t>5% </a:t>
-            </a:r>
-            <a:r>
-              <a:rPr lang="en-US" dirty="0"/>
-              <a:t>overall CI/CD knowledge.</a:t>
-            </a:r>
-          </a:p>
-          <a:p>
-            <a:endParaRPr lang="en-US" dirty="0"/>
-          </a:p>
-          <a:p>
-            <a:r>
-              <a:rPr lang="en-US" dirty="0"/>
-              <a:t>Should be able to manage the code base content using </a:t>
-            </a:r>
-            <a:r>
-              <a:rPr lang="en-US" dirty="0" err="1"/>
-              <a:t>Git</a:t>
-            </a:r>
-            <a:r>
-              <a:rPr lang="en-US" dirty="0"/>
-              <a:t> technologies </a:t>
-            </a:r>
-            <a:r>
-              <a:rPr lang="en-US" dirty="0" smtClean="0"/>
-              <a:t>and can </a:t>
-            </a:r>
-            <a:r>
-              <a:rPr lang="en-US" dirty="0"/>
-              <a:t>contribute towards the good health of the code using unit testing and </a:t>
-            </a:r>
-            <a:r>
-              <a:rPr lang="en-US" dirty="0" smtClean="0"/>
-              <a:t>the </a:t>
-            </a:r>
-            <a:r>
-              <a:rPr lang="en-US" dirty="0"/>
-              <a:t>overall good health of an application using functional testing (aka) End-to-End testing</a:t>
-            </a:r>
-            <a:r>
-              <a:rPr lang="en-US" dirty="0" smtClean="0"/>
-              <a:t>.</a:t>
-            </a:r>
-            <a:endParaRPr lang="en-US" dirty="0"/>
-          </a:p>
-        </p:txBody>
-      </p:sp>
-    </p:spTree>
-    <p:extLst>
-      <p:ext uri="{BB962C8B-B14F-4D97-AF65-F5344CB8AC3E}">
-        <p14:creationId xmlns:p14="http://schemas.microsoft.com/office/powerpoint/2010/main" val="1970731286"/>
-      </p:ext>
-    </p:extLst>
-  </p:cSld>
-  <p:clrMapOvr>
-    <a:masterClrMapping/>
-  </p:clrMapOvr>
-</p:sld>
-</file>
-
 <file path=ppt/slides/slide12.xml><?xml version="1.0" encoding="utf-8"?>
 <p:sld xmlns:a="http://schemas.openxmlformats.org/drawingml/2006/main" xmlns:r="http://schemas.openxmlformats.org/officeDocument/2006/relationships" xmlns:p="http://schemas.openxmlformats.org/presentationml/2006/main">
   <p:cSld>
@@ -4096,6 +4037,166 @@
           <a:p>
             <a:r>
               <a:rPr lang="en-US" dirty="0" smtClean="0"/>
+              <a:t>Overall Expectations</a:t>
+            </a:r>
+            <a:endParaRPr lang="en-US" dirty="0"/>
+          </a:p>
+        </p:txBody>
+      </p:sp>
+      <p:sp>
+        <p:nvSpPr>
+          <p:cNvPr id="3" name="Content Placeholder 2"/>
+          <p:cNvSpPr>
+            <a:spLocks noGrp="1"/>
+          </p:cNvSpPr>
+          <p:nvPr>
+            <p:ph idx="1"/>
+          </p:nvPr>
+        </p:nvSpPr>
+        <p:spPr/>
+        <p:txBody>
+          <a:bodyPr/>
+          <a:lstStyle/>
+          <a:p>
+            <a:r>
+              <a:rPr lang="en-US" dirty="0"/>
+              <a:t>The expectations in this training is to create Java full stack developers with </a:t>
+            </a:r>
+            <a:r>
+              <a:rPr lang="en-US" dirty="0" smtClean="0"/>
+              <a:t>about:</a:t>
+            </a:r>
+          </a:p>
+          <a:p>
+            <a:pPr lvl="1"/>
+            <a:r>
+              <a:rPr lang="en-US" dirty="0" smtClean="0"/>
+              <a:t>70</a:t>
+            </a:r>
+            <a:r>
+              <a:rPr lang="en-US" dirty="0"/>
+              <a:t>% service knowledge, </a:t>
+            </a:r>
+            <a:endParaRPr lang="en-US" dirty="0" smtClean="0"/>
+          </a:p>
+          <a:p>
+            <a:pPr lvl="1"/>
+            <a:r>
+              <a:rPr lang="en-US" dirty="0" smtClean="0"/>
+              <a:t>25% </a:t>
+            </a:r>
+            <a:r>
+              <a:rPr lang="en-US" dirty="0"/>
+              <a:t>front-end </a:t>
+            </a:r>
+            <a:r>
+              <a:rPr lang="en-US" dirty="0" smtClean="0"/>
+              <a:t>knowledge, </a:t>
+            </a:r>
+            <a:r>
+              <a:rPr lang="en-US" dirty="0"/>
+              <a:t>and </a:t>
+            </a:r>
+            <a:endParaRPr lang="en-US" dirty="0" smtClean="0"/>
+          </a:p>
+          <a:p>
+            <a:pPr lvl="1"/>
+            <a:r>
+              <a:rPr lang="en-US" dirty="0" smtClean="0"/>
+              <a:t>5% </a:t>
+            </a:r>
+            <a:r>
+              <a:rPr lang="en-US" dirty="0"/>
+              <a:t>overall CI/CD knowledge.</a:t>
+            </a:r>
+          </a:p>
+          <a:p>
+            <a:endParaRPr lang="en-US" dirty="0"/>
+          </a:p>
+          <a:p>
+            <a:r>
+              <a:rPr lang="en-US" dirty="0"/>
+              <a:t>Should be able to manage the code base content using </a:t>
+            </a:r>
+            <a:r>
+              <a:rPr lang="en-US" dirty="0" err="1"/>
+              <a:t>Git</a:t>
+            </a:r>
+            <a:r>
+              <a:rPr lang="en-US" dirty="0"/>
+              <a:t> technologies </a:t>
+            </a:r>
+            <a:r>
+              <a:rPr lang="en-US" dirty="0" smtClean="0"/>
+              <a:t>and can </a:t>
+            </a:r>
+            <a:r>
+              <a:rPr lang="en-US" dirty="0"/>
+              <a:t>contribute towards the good health of the code using unit testing and </a:t>
+            </a:r>
+            <a:r>
+              <a:rPr lang="en-US" dirty="0" smtClean="0"/>
+              <a:t>the </a:t>
+            </a:r>
+            <a:r>
+              <a:rPr lang="en-US" dirty="0"/>
+              <a:t>overall good health of an application using functional testing (aka) End-to-End testing</a:t>
+            </a:r>
+            <a:r>
+              <a:rPr lang="en-US" dirty="0" smtClean="0"/>
+              <a:t>.</a:t>
+            </a:r>
+            <a:endParaRPr lang="en-US" dirty="0"/>
+          </a:p>
+        </p:txBody>
+      </p:sp>
+    </p:spTree>
+    <p:extLst>
+      <p:ext uri="{BB962C8B-B14F-4D97-AF65-F5344CB8AC3E}">
+        <p14:creationId xmlns:p14="http://schemas.microsoft.com/office/powerpoint/2010/main" val="1970731286"/>
+      </p:ext>
+    </p:extLst>
+  </p:cSld>
+  <p:clrMapOvr>
+    <a:masterClrMapping/>
+  </p:clrMapOvr>
+</p:sld>
+</file>
+
+<file path=ppt/slides/slide13.xml><?xml version="1.0" encoding="utf-8"?>
+<p:sld xmlns:a="http://schemas.openxmlformats.org/drawingml/2006/main" xmlns:r="http://schemas.openxmlformats.org/officeDocument/2006/relationships" xmlns:p="http://schemas.openxmlformats.org/presentationml/2006/main">
+  <p:cSld>
+    <p:spTree>
+      <p:nvGrpSpPr>
+        <p:cNvPr id="1" name=""/>
+        <p:cNvGrpSpPr/>
+        <p:nvPr/>
+      </p:nvGrpSpPr>
+      <p:grpSpPr>
+        <a:xfrm>
+          <a:off x="0" y="0"/>
+          <a:ext cx="0" cy="0"/>
+          <a:chOff x="0" y="0"/>
+          <a:chExt cx="0" cy="0"/>
+        </a:xfrm>
+      </p:grpSpPr>
+      <p:sp>
+        <p:nvSpPr>
+          <p:cNvPr id="2" name="Title 1"/>
+          <p:cNvSpPr>
+            <a:spLocks noGrp="1"/>
+          </p:cNvSpPr>
+          <p:nvPr>
+            <p:ph type="title"/>
+          </p:nvPr>
+        </p:nvSpPr>
+        <p:spPr/>
+        <p:txBody>
+          <a:bodyPr/>
+          <a:lstStyle/>
+          <a:p>
+            <a:r>
+              <a:rPr lang="en-US" dirty="0" smtClean="0"/>
               <a:t>IDEs for Training</a:t>
             </a:r>
             <a:endParaRPr lang="en-US" dirty="0"/>
@@ -4218,7 +4319,7 @@
 </p:sld>
 </file>
 
-<file path=ppt/slides/slide13.xml><?xml version="1.0" encoding="utf-8"?>
+<file path=ppt/slides/slide14.xml><?xml version="1.0" encoding="utf-8"?>
 <p:sld xmlns:a="http://schemas.openxmlformats.org/drawingml/2006/main" xmlns:r="http://schemas.openxmlformats.org/officeDocument/2006/relationships" xmlns:p="http://schemas.openxmlformats.org/presentationml/2006/main">
   <p:cSld>
     <p:spTree>
@@ -4564,11 +4665,7 @@
           <a:p>
             <a:r>
               <a:rPr lang="en-US" dirty="0" smtClean="0"/>
-              <a:t>E-Mail</a:t>
-            </a:r>
-            <a:r>
-              <a:rPr lang="en-US" dirty="0" smtClean="0"/>
-              <a:t>: </a:t>
+              <a:t>E-Mail: </a:t>
             </a:r>
             <a:r>
               <a:rPr lang="en-US" dirty="0" smtClean="0">
@@ -6127,7 +6224,11 @@
           <a:p>
             <a:r>
               <a:rPr lang="en-US" dirty="0" smtClean="0"/>
-              <a:t>Training Plan</a:t>
+              <a:t>Training </a:t>
+            </a:r>
+            <a:r>
+              <a:rPr lang="en-US" dirty="0" smtClean="0"/>
+              <a:t>Plan (Original)</a:t>
             </a:r>
             <a:endParaRPr lang="en-US" dirty="0"/>
           </a:p>
@@ -8240,74 +8341,2229 @@
             <p:ph type="title"/>
           </p:nvPr>
         </p:nvSpPr>
-        <p:spPr/>
+        <p:spPr>
+          <a:xfrm>
+            <a:off x="12047" y="-6555"/>
+            <a:ext cx="10515600" cy="791721"/>
+          </a:xfrm>
+        </p:spPr>
         <p:txBody>
           <a:bodyPr/>
           <a:lstStyle/>
           <a:p>
             <a:r>
-              <a:rPr lang="en-US" dirty="0"/>
-              <a:t>Skills Level (definitions)</a:t>
-            </a:r>
-          </a:p>
-        </p:txBody>
-      </p:sp>
-      <p:sp>
-        <p:nvSpPr>
-          <p:cNvPr id="3" name="Content Placeholder 2"/>
-          <p:cNvSpPr>
-            <a:spLocks noGrp="1"/>
+              <a:rPr lang="en-US" dirty="0" smtClean="0"/>
+              <a:t>Training </a:t>
+            </a:r>
+            <a:r>
+              <a:rPr lang="en-US" dirty="0" smtClean="0"/>
+              <a:t>Plan (Live)</a:t>
+            </a:r>
+            <a:endParaRPr lang="en-US" dirty="0"/>
+          </a:p>
+        </p:txBody>
+      </p:sp>
+      <p:sp>
+        <p:nvSpPr>
+          <p:cNvPr id="5" name="Content Placeholder 2"/>
+          <p:cNvSpPr txBox="1">
+            <a:spLocks/>
           </p:cNvSpPr>
-          <p:nvPr>
-            <p:ph idx="1"/>
-          </p:nvPr>
-        </p:nvSpPr>
-        <p:spPr>
-          <a:xfrm>
-            <a:off x="838200" y="1825625"/>
-            <a:ext cx="10515600" cy="2832100"/>
-          </a:xfrm>
-        </p:spPr>
-        <p:txBody>
-          <a:bodyPr/>
-          <a:lstStyle/>
-          <a:p>
-            <a:r>
-              <a:rPr lang="en-US" dirty="0" smtClean="0"/>
-              <a:t>Fundamental: basic knowledge</a:t>
-            </a:r>
-          </a:p>
-          <a:p>
-            <a:r>
-              <a:rPr lang="en-US" dirty="0" smtClean="0"/>
-              <a:t>Novice: limited experience</a:t>
-            </a:r>
-          </a:p>
-          <a:p>
-            <a:r>
-              <a:rPr lang="en-US" dirty="0" smtClean="0"/>
-              <a:t>Intermediate: practical application</a:t>
-            </a:r>
-          </a:p>
-          <a:p>
-            <a:r>
-              <a:rPr lang="en-US" dirty="0" smtClean="0"/>
-              <a:t>Advanced: applied theory</a:t>
-            </a:r>
-          </a:p>
-          <a:p>
-            <a:r>
-              <a:rPr lang="en-US" dirty="0" smtClean="0"/>
-              <a:t>Expert: recognized authority</a:t>
-            </a:r>
-            <a:endParaRPr lang="en-US" dirty="0"/>
-          </a:p>
-        </p:txBody>
-      </p:sp>
+          <p:nvPr/>
+        </p:nvSpPr>
+        <p:spPr>
+          <a:xfrm>
+            <a:off x="-1662391" y="2161233"/>
+            <a:ext cx="1282854" cy="4351338"/>
+          </a:xfrm>
+          <a:prstGeom prst="rect">
+            <a:avLst/>
+          </a:prstGeom>
+        </p:spPr>
+        <p:txBody>
+          <a:bodyPr vert="horz" lIns="91440" tIns="45720" rIns="91440" bIns="45720" rtlCol="0">
+            <a:noAutofit/>
+          </a:bodyPr>
+          <a:lstStyle>
+            <a:lvl1pPr marL="228600" indent="-228600">
+              <a:lnSpc>
+                <a:spcPct val="90000"/>
+              </a:lnSpc>
+              <a:spcBef>
+                <a:spcPts val="1000"/>
+              </a:spcBef>
+              <a:buFont typeface="Arial" panose="020B0604020202020204" pitchFamily="34" charset="0"/>
+              <a:buChar char="•"/>
+              <a:defRPr sz="2800"/>
+            </a:lvl1pPr>
+            <a:lvl2pPr marL="685800" lvl="1" indent="-228600">
+              <a:lnSpc>
+                <a:spcPct val="90000"/>
+              </a:lnSpc>
+              <a:spcBef>
+                <a:spcPts val="500"/>
+              </a:spcBef>
+              <a:buFont typeface="Arial" panose="020B0604020202020204" pitchFamily="34" charset="0"/>
+              <a:buChar char="•"/>
+              <a:defRPr sz="2400"/>
+            </a:lvl2pPr>
+            <a:lvl3pPr marL="1143000" indent="-228600">
+              <a:lnSpc>
+                <a:spcPct val="90000"/>
+              </a:lnSpc>
+              <a:spcBef>
+                <a:spcPts val="500"/>
+              </a:spcBef>
+              <a:buFont typeface="Arial" panose="020B0604020202020204" pitchFamily="34" charset="0"/>
+              <a:buChar char="•"/>
+              <a:defRPr sz="2000"/>
+            </a:lvl3pPr>
+            <a:lvl4pPr marL="1600200" indent="-228600">
+              <a:lnSpc>
+                <a:spcPct val="90000"/>
+              </a:lnSpc>
+              <a:spcBef>
+                <a:spcPts val="500"/>
+              </a:spcBef>
+              <a:buFont typeface="Arial" panose="020B0604020202020204" pitchFamily="34" charset="0"/>
+              <a:buChar char="•"/>
+            </a:lvl4pPr>
+            <a:lvl5pPr marL="2057400" indent="-228600">
+              <a:lnSpc>
+                <a:spcPct val="90000"/>
+              </a:lnSpc>
+              <a:spcBef>
+                <a:spcPts val="500"/>
+              </a:spcBef>
+              <a:buFont typeface="Arial" panose="020B0604020202020204" pitchFamily="34" charset="0"/>
+              <a:buChar char="•"/>
+            </a:lvl5pPr>
+            <a:lvl6pPr marL="2514600" indent="-228600">
+              <a:lnSpc>
+                <a:spcPct val="90000"/>
+              </a:lnSpc>
+              <a:spcBef>
+                <a:spcPts val="500"/>
+              </a:spcBef>
+              <a:buFont typeface="Arial" panose="020B0604020202020204" pitchFamily="34" charset="0"/>
+              <a:buChar char="•"/>
+            </a:lvl6pPr>
+            <a:lvl7pPr marL="2971800" indent="-228600">
+              <a:lnSpc>
+                <a:spcPct val="90000"/>
+              </a:lnSpc>
+              <a:spcBef>
+                <a:spcPts val="500"/>
+              </a:spcBef>
+              <a:buFont typeface="Arial" panose="020B0604020202020204" pitchFamily="34" charset="0"/>
+              <a:buChar char="•"/>
+            </a:lvl7pPr>
+            <a:lvl8pPr marL="3429000" indent="-228600">
+              <a:lnSpc>
+                <a:spcPct val="90000"/>
+              </a:lnSpc>
+              <a:spcBef>
+                <a:spcPts val="500"/>
+              </a:spcBef>
+              <a:buFont typeface="Arial" panose="020B0604020202020204" pitchFamily="34" charset="0"/>
+              <a:buChar char="•"/>
+            </a:lvl8pPr>
+            <a:lvl9pPr marL="3886200" indent="-228600">
+              <a:lnSpc>
+                <a:spcPct val="90000"/>
+              </a:lnSpc>
+              <a:spcBef>
+                <a:spcPts val="500"/>
+              </a:spcBef>
+              <a:buFont typeface="Arial" panose="020B0604020202020204" pitchFamily="34" charset="0"/>
+              <a:buChar char="•"/>
+            </a:lvl9pPr>
+          </a:lstStyle>
+          <a:p>
+            <a:pPr lvl="1"/>
+            <a:endParaRPr lang="en-US" sz="1000" dirty="0"/>
+          </a:p>
+          <a:p>
+            <a:pPr lvl="1"/>
+            <a:endParaRPr lang="en-US" sz="1000" dirty="0"/>
+          </a:p>
+        </p:txBody>
+      </p:sp>
+      <p:sp>
+        <p:nvSpPr>
+          <p:cNvPr id="7" name="Oval 6"/>
+          <p:cNvSpPr/>
+          <p:nvPr/>
+        </p:nvSpPr>
+        <p:spPr>
+          <a:xfrm>
+            <a:off x="3265558" y="977151"/>
+            <a:ext cx="1465009" cy="1259921"/>
+          </a:xfrm>
+          <a:prstGeom prst="ellipse">
+            <a:avLst/>
+          </a:prstGeom>
+          <a:solidFill>
+            <a:schemeClr val="accent5">
+              <a:lumMod val="20000"/>
+              <a:lumOff val="80000"/>
+            </a:schemeClr>
+          </a:solidFill>
+        </p:spPr>
+        <p:style>
+          <a:lnRef idx="2">
+            <a:schemeClr val="accent1">
+              <a:shade val="50000"/>
+            </a:schemeClr>
+          </a:lnRef>
+          <a:fillRef idx="1">
+            <a:schemeClr val="accent1"/>
+          </a:fillRef>
+          <a:effectRef idx="0">
+            <a:schemeClr val="accent1"/>
+          </a:effectRef>
+          <a:fontRef idx="minor">
+            <a:schemeClr val="lt1"/>
+          </a:fontRef>
+        </p:style>
+        <p:txBody>
+          <a:bodyPr rtlCol="0" anchor="ctr"/>
+          <a:lstStyle/>
+          <a:p>
+            <a:pPr algn="ctr"/>
+            <a:r>
+              <a:rPr lang="en-US" sz="1200" dirty="0" smtClean="0">
+                <a:solidFill>
+                  <a:schemeClr val="tx1"/>
+                </a:solidFill>
+              </a:rPr>
+              <a:t>Intro</a:t>
+            </a:r>
+          </a:p>
+          <a:p>
+            <a:pPr algn="ctr"/>
+            <a:r>
+              <a:rPr lang="en-US" sz="1200" dirty="0" smtClean="0">
+                <a:solidFill>
+                  <a:schemeClr val="tx1"/>
+                </a:solidFill>
+              </a:rPr>
+              <a:t>Problem Solving Skills</a:t>
+            </a:r>
+          </a:p>
+        </p:txBody>
+      </p:sp>
+      <p:cxnSp>
+        <p:nvCxnSpPr>
+          <p:cNvPr id="9" name="Straight Arrow Connector 8"/>
+          <p:cNvCxnSpPr/>
+          <p:nvPr/>
+        </p:nvCxnSpPr>
+        <p:spPr>
+          <a:xfrm>
+            <a:off x="2511593" y="1584534"/>
+            <a:ext cx="536931" cy="1"/>
+          </a:xfrm>
+          <a:prstGeom prst="straightConnector1">
+            <a:avLst/>
+          </a:prstGeom>
+          <a:ln>
+            <a:tailEnd type="triangle"/>
+          </a:ln>
+        </p:spPr>
+        <p:style>
+          <a:lnRef idx="1">
+            <a:schemeClr val="accent1"/>
+          </a:lnRef>
+          <a:fillRef idx="0">
+            <a:schemeClr val="accent1"/>
+          </a:fillRef>
+          <a:effectRef idx="0">
+            <a:schemeClr val="accent1"/>
+          </a:effectRef>
+          <a:fontRef idx="minor">
+            <a:schemeClr val="tx1"/>
+          </a:fontRef>
+        </p:style>
+      </p:cxnSp>
+      <p:sp>
+        <p:nvSpPr>
+          <p:cNvPr id="10" name="Oval 9"/>
+          <p:cNvSpPr/>
+          <p:nvPr/>
+        </p:nvSpPr>
+        <p:spPr>
+          <a:xfrm>
+            <a:off x="886688" y="984986"/>
+            <a:ext cx="1465009" cy="1259921"/>
+          </a:xfrm>
+          <a:prstGeom prst="ellipse">
+            <a:avLst/>
+          </a:prstGeom>
+          <a:solidFill>
+            <a:schemeClr val="accent6">
+              <a:lumMod val="20000"/>
+              <a:lumOff val="80000"/>
+            </a:schemeClr>
+          </a:solidFill>
+        </p:spPr>
+        <p:style>
+          <a:lnRef idx="2">
+            <a:schemeClr val="accent1">
+              <a:shade val="50000"/>
+            </a:schemeClr>
+          </a:lnRef>
+          <a:fillRef idx="1">
+            <a:schemeClr val="accent1"/>
+          </a:fillRef>
+          <a:effectRef idx="0">
+            <a:schemeClr val="accent1"/>
+          </a:effectRef>
+          <a:fontRef idx="minor">
+            <a:schemeClr val="lt1"/>
+          </a:fontRef>
+        </p:style>
+        <p:txBody>
+          <a:bodyPr rtlCol="0" anchor="ctr"/>
+          <a:lstStyle/>
+          <a:p>
+            <a:pPr algn="ctr"/>
+            <a:r>
+              <a:rPr lang="en-US" sz="2000" b="1" dirty="0" smtClean="0">
+                <a:solidFill>
+                  <a:schemeClr val="tx1"/>
+                </a:solidFill>
+              </a:rPr>
+              <a:t>Start</a:t>
+            </a:r>
+            <a:endParaRPr lang="en-US" sz="2000" b="1" dirty="0">
+              <a:solidFill>
+                <a:schemeClr val="tx1"/>
+              </a:solidFill>
+            </a:endParaRPr>
+          </a:p>
+        </p:txBody>
+      </p:sp>
+      <p:sp>
+        <p:nvSpPr>
+          <p:cNvPr id="12" name="Oval 11"/>
+          <p:cNvSpPr/>
+          <p:nvPr/>
+        </p:nvSpPr>
+        <p:spPr>
+          <a:xfrm>
+            <a:off x="5558870" y="954574"/>
+            <a:ext cx="1465009" cy="1259921"/>
+          </a:xfrm>
+          <a:prstGeom prst="ellipse">
+            <a:avLst/>
+          </a:prstGeom>
+          <a:solidFill>
+            <a:schemeClr val="accent5">
+              <a:lumMod val="20000"/>
+              <a:lumOff val="80000"/>
+            </a:schemeClr>
+          </a:solidFill>
+        </p:spPr>
+        <p:style>
+          <a:lnRef idx="2">
+            <a:schemeClr val="accent1">
+              <a:shade val="50000"/>
+            </a:schemeClr>
+          </a:lnRef>
+          <a:fillRef idx="1">
+            <a:schemeClr val="accent1"/>
+          </a:fillRef>
+          <a:effectRef idx="0">
+            <a:schemeClr val="accent1"/>
+          </a:effectRef>
+          <a:fontRef idx="minor">
+            <a:schemeClr val="lt1"/>
+          </a:fontRef>
+        </p:style>
+        <p:txBody>
+          <a:bodyPr rtlCol="0" anchor="ctr"/>
+          <a:lstStyle/>
+          <a:p>
+            <a:pPr algn="ctr"/>
+            <a:r>
+              <a:rPr lang="en-US" sz="1200" dirty="0" smtClean="0">
+                <a:solidFill>
+                  <a:schemeClr val="tx1"/>
+                </a:solidFill>
+              </a:rPr>
+              <a:t>Intro to Programming Concepts</a:t>
+            </a:r>
+          </a:p>
+          <a:p>
+            <a:pPr algn="ctr"/>
+            <a:r>
+              <a:rPr lang="en-US" sz="1200" dirty="0" smtClean="0">
+                <a:solidFill>
+                  <a:schemeClr val="tx1"/>
+                </a:solidFill>
+              </a:rPr>
+              <a:t>And Unit Testing Basics</a:t>
+            </a:r>
+          </a:p>
+        </p:txBody>
+      </p:sp>
+      <p:cxnSp>
+        <p:nvCxnSpPr>
+          <p:cNvPr id="13" name="Straight Arrow Connector 12"/>
+          <p:cNvCxnSpPr/>
+          <p:nvPr/>
+        </p:nvCxnSpPr>
+        <p:spPr>
+          <a:xfrm>
+            <a:off x="4862043" y="1534675"/>
+            <a:ext cx="536931" cy="1"/>
+          </a:xfrm>
+          <a:prstGeom prst="straightConnector1">
+            <a:avLst/>
+          </a:prstGeom>
+          <a:ln>
+            <a:tailEnd type="triangle"/>
+          </a:ln>
+        </p:spPr>
+        <p:style>
+          <a:lnRef idx="1">
+            <a:schemeClr val="accent1"/>
+          </a:lnRef>
+          <a:fillRef idx="0">
+            <a:schemeClr val="accent1"/>
+          </a:fillRef>
+          <a:effectRef idx="0">
+            <a:schemeClr val="accent1"/>
+          </a:effectRef>
+          <a:fontRef idx="minor">
+            <a:schemeClr val="tx1"/>
+          </a:fontRef>
+        </p:style>
+      </p:cxnSp>
+      <p:sp>
+        <p:nvSpPr>
+          <p:cNvPr id="14" name="TextBox 13"/>
+          <p:cNvSpPr txBox="1"/>
+          <p:nvPr/>
+        </p:nvSpPr>
+        <p:spPr>
+          <a:xfrm>
+            <a:off x="3067570" y="706414"/>
+            <a:ext cx="1328430" cy="276999"/>
+          </a:xfrm>
+          <a:prstGeom prst="rect">
+            <a:avLst/>
+          </a:prstGeom>
+          <a:noFill/>
+        </p:spPr>
+        <p:txBody>
+          <a:bodyPr wrap="square" rtlCol="0">
+            <a:spAutoFit/>
+          </a:bodyPr>
+          <a:lstStyle/>
+          <a:p>
+            <a:r>
+              <a:rPr lang="en-US" sz="1200" b="1" dirty="0" smtClean="0"/>
+              <a:t>1 </a:t>
+            </a:r>
+            <a:r>
+              <a:rPr lang="en-US" sz="1200" b="1" dirty="0" smtClean="0"/>
+              <a:t>day (June 19) </a:t>
+            </a:r>
+            <a:endParaRPr lang="en-US" sz="1200" b="1" dirty="0"/>
+          </a:p>
+        </p:txBody>
+      </p:sp>
+      <p:sp>
+        <p:nvSpPr>
+          <p:cNvPr id="15" name="TextBox 14"/>
+          <p:cNvSpPr txBox="1"/>
+          <p:nvPr/>
+        </p:nvSpPr>
+        <p:spPr>
+          <a:xfrm>
+            <a:off x="5309855" y="707987"/>
+            <a:ext cx="1282137" cy="276999"/>
+          </a:xfrm>
+          <a:prstGeom prst="rect">
+            <a:avLst/>
+          </a:prstGeom>
+          <a:noFill/>
+        </p:spPr>
+        <p:txBody>
+          <a:bodyPr wrap="square" rtlCol="0">
+            <a:spAutoFit/>
+          </a:bodyPr>
+          <a:lstStyle/>
+          <a:p>
+            <a:r>
+              <a:rPr lang="en-US" sz="1200" b="1" dirty="0" smtClean="0"/>
+              <a:t>1 </a:t>
+            </a:r>
+            <a:r>
+              <a:rPr lang="en-US" sz="1200" b="1" dirty="0" smtClean="0"/>
+              <a:t>day (June 20)</a:t>
+            </a:r>
+            <a:endParaRPr lang="en-US" sz="1200" b="1" dirty="0"/>
+          </a:p>
+        </p:txBody>
+      </p:sp>
+      <p:sp>
+        <p:nvSpPr>
+          <p:cNvPr id="16" name="Oval 15"/>
+          <p:cNvSpPr/>
+          <p:nvPr/>
+        </p:nvSpPr>
+        <p:spPr>
+          <a:xfrm>
+            <a:off x="7892251" y="924895"/>
+            <a:ext cx="1465009" cy="1259921"/>
+          </a:xfrm>
+          <a:prstGeom prst="ellipse">
+            <a:avLst/>
+          </a:prstGeom>
+          <a:solidFill>
+            <a:schemeClr val="accent5">
+              <a:lumMod val="20000"/>
+              <a:lumOff val="80000"/>
+            </a:schemeClr>
+          </a:solidFill>
+        </p:spPr>
+        <p:style>
+          <a:lnRef idx="2">
+            <a:schemeClr val="accent1">
+              <a:shade val="50000"/>
+            </a:schemeClr>
+          </a:lnRef>
+          <a:fillRef idx="1">
+            <a:schemeClr val="accent1"/>
+          </a:fillRef>
+          <a:effectRef idx="0">
+            <a:schemeClr val="accent1"/>
+          </a:effectRef>
+          <a:fontRef idx="minor">
+            <a:schemeClr val="lt1"/>
+          </a:fontRef>
+        </p:style>
+        <p:txBody>
+          <a:bodyPr rtlCol="0" anchor="ctr"/>
+          <a:lstStyle/>
+          <a:p>
+            <a:pPr algn="ctr"/>
+            <a:r>
+              <a:rPr lang="en-US" sz="1200" dirty="0" smtClean="0">
+                <a:solidFill>
+                  <a:schemeClr val="tx1"/>
+                </a:solidFill>
+              </a:rPr>
+              <a:t>XAMPP</a:t>
+            </a:r>
+            <a:br>
+              <a:rPr lang="en-US" sz="1200" dirty="0" smtClean="0">
+                <a:solidFill>
+                  <a:schemeClr val="tx1"/>
+                </a:solidFill>
+              </a:rPr>
+            </a:br>
+            <a:r>
+              <a:rPr lang="en-US" sz="1200" dirty="0" smtClean="0">
+                <a:solidFill>
+                  <a:schemeClr val="tx1"/>
+                </a:solidFill>
+              </a:rPr>
+              <a:t>HTML</a:t>
+            </a:r>
+          </a:p>
+          <a:p>
+            <a:pPr algn="ctr"/>
+            <a:r>
+              <a:rPr lang="en-US" sz="1200" dirty="0" smtClean="0">
+                <a:solidFill>
+                  <a:schemeClr val="tx1"/>
+                </a:solidFill>
+              </a:rPr>
+              <a:t>CSS </a:t>
+            </a:r>
+          </a:p>
+          <a:p>
+            <a:pPr algn="ctr"/>
+            <a:r>
+              <a:rPr lang="en-US" sz="1200" dirty="0" smtClean="0">
+                <a:solidFill>
+                  <a:schemeClr val="tx1"/>
+                </a:solidFill>
+              </a:rPr>
+              <a:t>JavaScript</a:t>
+            </a:r>
+            <a:endParaRPr lang="en-US" sz="1200" dirty="0" smtClean="0">
+              <a:solidFill>
+                <a:schemeClr val="tx1"/>
+              </a:solidFill>
+            </a:endParaRPr>
+          </a:p>
+        </p:txBody>
+      </p:sp>
+      <p:cxnSp>
+        <p:nvCxnSpPr>
+          <p:cNvPr id="17" name="Straight Arrow Connector 16"/>
+          <p:cNvCxnSpPr/>
+          <p:nvPr/>
+        </p:nvCxnSpPr>
+        <p:spPr>
+          <a:xfrm>
+            <a:off x="7259626" y="1554854"/>
+            <a:ext cx="536931" cy="1"/>
+          </a:xfrm>
+          <a:prstGeom prst="straightConnector1">
+            <a:avLst/>
+          </a:prstGeom>
+          <a:ln>
+            <a:tailEnd type="triangle"/>
+          </a:ln>
+        </p:spPr>
+        <p:style>
+          <a:lnRef idx="1">
+            <a:schemeClr val="accent1"/>
+          </a:lnRef>
+          <a:fillRef idx="0">
+            <a:schemeClr val="accent1"/>
+          </a:fillRef>
+          <a:effectRef idx="0">
+            <a:schemeClr val="accent1"/>
+          </a:effectRef>
+          <a:fontRef idx="minor">
+            <a:schemeClr val="tx1"/>
+          </a:fontRef>
+        </p:style>
+      </p:cxnSp>
+      <p:sp>
+        <p:nvSpPr>
+          <p:cNvPr id="18" name="TextBox 17"/>
+          <p:cNvSpPr txBox="1"/>
+          <p:nvPr/>
+        </p:nvSpPr>
+        <p:spPr>
+          <a:xfrm>
+            <a:off x="2984807" y="2280468"/>
+            <a:ext cx="1920081" cy="276999"/>
+          </a:xfrm>
+          <a:prstGeom prst="rect">
+            <a:avLst/>
+          </a:prstGeom>
+          <a:noFill/>
+        </p:spPr>
+        <p:txBody>
+          <a:bodyPr wrap="square" rtlCol="0">
+            <a:spAutoFit/>
+          </a:bodyPr>
+          <a:lstStyle/>
+          <a:p>
+            <a:pPr algn="ctr"/>
+            <a:r>
+              <a:rPr lang="en-US" sz="1200" dirty="0" smtClean="0"/>
+              <a:t>Using GitHub to Store Files</a:t>
+            </a:r>
+            <a:endParaRPr lang="en-US" sz="1200" dirty="0"/>
+          </a:p>
+        </p:txBody>
+      </p:sp>
+      <p:sp>
+        <p:nvSpPr>
+          <p:cNvPr id="19" name="TextBox 18"/>
+          <p:cNvSpPr txBox="1"/>
+          <p:nvPr/>
+        </p:nvSpPr>
+        <p:spPr>
+          <a:xfrm>
+            <a:off x="4944620" y="2278789"/>
+            <a:ext cx="2722648" cy="646331"/>
+          </a:xfrm>
+          <a:prstGeom prst="rect">
+            <a:avLst/>
+          </a:prstGeom>
+          <a:noFill/>
+        </p:spPr>
+        <p:txBody>
+          <a:bodyPr wrap="square" rtlCol="0">
+            <a:spAutoFit/>
+          </a:bodyPr>
+          <a:lstStyle/>
+          <a:p>
+            <a:pPr algn="ctr"/>
+            <a:r>
+              <a:rPr lang="en-US" sz="1200" dirty="0" smtClean="0"/>
+              <a:t>JavaScript </a:t>
+            </a:r>
+            <a:r>
+              <a:rPr lang="en-US" sz="1200" dirty="0" smtClean="0"/>
+              <a:t>(</a:t>
+            </a:r>
+            <a:r>
+              <a:rPr lang="en-US" sz="1200" dirty="0" err="1" smtClean="0"/>
+              <a:t>NodeJS</a:t>
+            </a:r>
+            <a:r>
+              <a:rPr lang="en-US" sz="1200" dirty="0" smtClean="0"/>
+              <a:t>/Browser)</a:t>
+            </a:r>
+          </a:p>
+          <a:p>
+            <a:pPr algn="ctr"/>
+            <a:r>
+              <a:rPr lang="en-US" sz="1200" dirty="0" smtClean="0"/>
+              <a:t>Command Line Interface</a:t>
+            </a:r>
+          </a:p>
+          <a:p>
+            <a:pPr algn="ctr"/>
+            <a:r>
+              <a:rPr lang="en-US" sz="1200" dirty="0" smtClean="0"/>
+              <a:t>Jasmine</a:t>
+            </a:r>
+            <a:endParaRPr lang="en-US" sz="1200" dirty="0" smtClean="0"/>
+          </a:p>
+        </p:txBody>
+      </p:sp>
+      <p:sp>
+        <p:nvSpPr>
+          <p:cNvPr id="20" name="TextBox 19"/>
+          <p:cNvSpPr txBox="1"/>
+          <p:nvPr/>
+        </p:nvSpPr>
+        <p:spPr>
+          <a:xfrm>
+            <a:off x="7789699" y="687020"/>
+            <a:ext cx="1866602" cy="276999"/>
+          </a:xfrm>
+          <a:prstGeom prst="rect">
+            <a:avLst/>
+          </a:prstGeom>
+          <a:noFill/>
+        </p:spPr>
+        <p:txBody>
+          <a:bodyPr wrap="square" rtlCol="0">
+            <a:spAutoFit/>
+          </a:bodyPr>
+          <a:lstStyle/>
+          <a:p>
+            <a:r>
+              <a:rPr lang="en-US" sz="1200" b="1" dirty="0" smtClean="0"/>
+              <a:t>7 days (June 21 to July 1</a:t>
+            </a:r>
+            <a:r>
+              <a:rPr lang="en-US" sz="1200" b="1" baseline="30000" dirty="0" smtClean="0"/>
+              <a:t>st</a:t>
+            </a:r>
+            <a:r>
+              <a:rPr lang="en-US" sz="1200" b="1" dirty="0" smtClean="0"/>
+              <a:t>)</a:t>
+            </a:r>
+            <a:endParaRPr lang="en-US" sz="1200" b="1" dirty="0"/>
+          </a:p>
+        </p:txBody>
+      </p:sp>
+      <p:sp>
+        <p:nvSpPr>
+          <p:cNvPr id="21" name="TextBox 20"/>
+          <p:cNvSpPr txBox="1"/>
+          <p:nvPr/>
+        </p:nvSpPr>
+        <p:spPr>
+          <a:xfrm>
+            <a:off x="7593209" y="2237072"/>
+            <a:ext cx="2063092" cy="461665"/>
+          </a:xfrm>
+          <a:prstGeom prst="rect">
+            <a:avLst/>
+          </a:prstGeom>
+          <a:noFill/>
+        </p:spPr>
+        <p:txBody>
+          <a:bodyPr wrap="square" rtlCol="0">
+            <a:spAutoFit/>
+          </a:bodyPr>
+          <a:lstStyle/>
+          <a:p>
+            <a:pPr algn="ctr"/>
+            <a:r>
+              <a:rPr lang="en-US" sz="1200" dirty="0" smtClean="0"/>
+              <a:t>XAMPP </a:t>
+            </a:r>
+            <a:endParaRPr lang="en-US" sz="1200" dirty="0"/>
+          </a:p>
+          <a:p>
+            <a:pPr algn="ctr"/>
+            <a:r>
+              <a:rPr lang="en-US" sz="1200" dirty="0" smtClean="0"/>
+              <a:t>Basic HTML/CSS/JS (ES5)</a:t>
+            </a:r>
+          </a:p>
+        </p:txBody>
+      </p:sp>
+      <p:sp>
+        <p:nvSpPr>
+          <p:cNvPr id="22" name="Oval 21"/>
+          <p:cNvSpPr/>
+          <p:nvPr/>
+        </p:nvSpPr>
+        <p:spPr>
+          <a:xfrm>
+            <a:off x="10158608" y="895220"/>
+            <a:ext cx="1465009" cy="1259921"/>
+          </a:xfrm>
+          <a:prstGeom prst="ellipse">
+            <a:avLst/>
+          </a:prstGeom>
+          <a:solidFill>
+            <a:schemeClr val="accent5">
+              <a:lumMod val="20000"/>
+              <a:lumOff val="80000"/>
+            </a:schemeClr>
+          </a:solidFill>
+        </p:spPr>
+        <p:style>
+          <a:lnRef idx="2">
+            <a:schemeClr val="accent1">
+              <a:shade val="50000"/>
+            </a:schemeClr>
+          </a:lnRef>
+          <a:fillRef idx="1">
+            <a:schemeClr val="accent1"/>
+          </a:fillRef>
+          <a:effectRef idx="0">
+            <a:schemeClr val="accent1"/>
+          </a:effectRef>
+          <a:fontRef idx="minor">
+            <a:schemeClr val="lt1"/>
+          </a:fontRef>
+        </p:style>
+        <p:txBody>
+          <a:bodyPr rtlCol="0" anchor="ctr"/>
+          <a:lstStyle/>
+          <a:p>
+            <a:pPr algn="ctr"/>
+            <a:r>
+              <a:rPr lang="en-US" sz="1200" dirty="0">
+                <a:solidFill>
+                  <a:schemeClr val="tx1"/>
+                </a:solidFill>
+              </a:rPr>
+              <a:t>Core </a:t>
+            </a:r>
+            <a:r>
+              <a:rPr lang="en-US" sz="1200" dirty="0" smtClean="0">
+                <a:solidFill>
+                  <a:schemeClr val="tx1"/>
+                </a:solidFill>
+              </a:rPr>
+              <a:t>Java +</a:t>
+            </a:r>
+            <a:endParaRPr lang="en-US" sz="1200" dirty="0">
+              <a:solidFill>
+                <a:schemeClr val="tx1"/>
+              </a:solidFill>
+            </a:endParaRPr>
+          </a:p>
+          <a:p>
+            <a:pPr algn="ctr"/>
+            <a:r>
+              <a:rPr lang="en-US" sz="1200" dirty="0" smtClean="0">
+                <a:solidFill>
+                  <a:schemeClr val="tx1"/>
+                </a:solidFill>
+              </a:rPr>
+              <a:t>Advanced </a:t>
+            </a:r>
+            <a:r>
+              <a:rPr lang="en-US" sz="1200" dirty="0" smtClean="0">
+                <a:solidFill>
+                  <a:schemeClr val="tx1"/>
+                </a:solidFill>
+              </a:rPr>
+              <a:t>Java</a:t>
+            </a:r>
+          </a:p>
+        </p:txBody>
+      </p:sp>
+      <p:cxnSp>
+        <p:nvCxnSpPr>
+          <p:cNvPr id="23" name="Straight Arrow Connector 22"/>
+          <p:cNvCxnSpPr/>
+          <p:nvPr/>
+        </p:nvCxnSpPr>
+        <p:spPr>
+          <a:xfrm>
+            <a:off x="9538612" y="1554856"/>
+            <a:ext cx="536931" cy="1"/>
+          </a:xfrm>
+          <a:prstGeom prst="straightConnector1">
+            <a:avLst/>
+          </a:prstGeom>
+          <a:ln>
+            <a:tailEnd type="triangle"/>
+          </a:ln>
+        </p:spPr>
+        <p:style>
+          <a:lnRef idx="1">
+            <a:schemeClr val="accent1"/>
+          </a:lnRef>
+          <a:fillRef idx="0">
+            <a:schemeClr val="accent1"/>
+          </a:fillRef>
+          <a:effectRef idx="0">
+            <a:schemeClr val="accent1"/>
+          </a:effectRef>
+          <a:fontRef idx="minor">
+            <a:schemeClr val="tx1"/>
+          </a:fontRef>
+        </p:style>
+      </p:cxnSp>
+      <p:sp>
+        <p:nvSpPr>
+          <p:cNvPr id="24" name="TextBox 23"/>
+          <p:cNvSpPr txBox="1"/>
+          <p:nvPr/>
+        </p:nvSpPr>
+        <p:spPr>
+          <a:xfrm>
+            <a:off x="9990128" y="677575"/>
+            <a:ext cx="2013450" cy="276999"/>
+          </a:xfrm>
+          <a:prstGeom prst="rect">
+            <a:avLst/>
+          </a:prstGeom>
+          <a:noFill/>
+        </p:spPr>
+        <p:txBody>
+          <a:bodyPr wrap="square" rtlCol="0">
+            <a:spAutoFit/>
+          </a:bodyPr>
+          <a:lstStyle/>
+          <a:p>
+            <a:r>
+              <a:rPr lang="en-US" sz="1200" b="1" dirty="0" smtClean="0"/>
+              <a:t>19 days (July 2</a:t>
+            </a:r>
+            <a:r>
+              <a:rPr lang="en-US" sz="1200" b="1" baseline="30000" dirty="0" smtClean="0"/>
+              <a:t>nd</a:t>
+            </a:r>
+            <a:r>
+              <a:rPr lang="en-US" sz="1200" b="1" dirty="0" smtClean="0"/>
+              <a:t> to July 26</a:t>
+            </a:r>
+            <a:r>
+              <a:rPr lang="en-US" sz="1200" b="1" baseline="30000" dirty="0" smtClean="0"/>
+              <a:t>th</a:t>
+            </a:r>
+            <a:r>
+              <a:rPr lang="en-US" sz="1200" b="1" dirty="0" smtClean="0"/>
+              <a:t> )</a:t>
+            </a:r>
+            <a:endParaRPr lang="en-US" sz="1200" b="1" dirty="0"/>
+          </a:p>
+        </p:txBody>
+      </p:sp>
+      <p:sp>
+        <p:nvSpPr>
+          <p:cNvPr id="25" name="TextBox 24"/>
+          <p:cNvSpPr txBox="1"/>
+          <p:nvPr/>
+        </p:nvSpPr>
+        <p:spPr>
+          <a:xfrm>
+            <a:off x="9897410" y="2237072"/>
+            <a:ext cx="1964852" cy="646331"/>
+          </a:xfrm>
+          <a:prstGeom prst="rect">
+            <a:avLst/>
+          </a:prstGeom>
+          <a:noFill/>
+        </p:spPr>
+        <p:txBody>
+          <a:bodyPr wrap="square" rtlCol="0">
+            <a:spAutoFit/>
+          </a:bodyPr>
+          <a:lstStyle/>
+          <a:p>
+            <a:pPr algn="ctr"/>
+            <a:r>
+              <a:rPr lang="en-US" sz="1200" dirty="0" smtClean="0"/>
+              <a:t>All Core Java + 1.8 + Swing + JavaFX minus Applets also covered =&gt; operator ES6 JS</a:t>
+            </a:r>
+            <a:endParaRPr lang="en-US" sz="1200" dirty="0" smtClean="0"/>
+          </a:p>
+        </p:txBody>
+      </p:sp>
+      <p:sp>
+        <p:nvSpPr>
+          <p:cNvPr id="33" name="TextBox 32"/>
+          <p:cNvSpPr txBox="1"/>
+          <p:nvPr/>
+        </p:nvSpPr>
+        <p:spPr>
+          <a:xfrm>
+            <a:off x="640789" y="3161835"/>
+            <a:ext cx="2053314" cy="276999"/>
+          </a:xfrm>
+          <a:prstGeom prst="rect">
+            <a:avLst/>
+          </a:prstGeom>
+          <a:noFill/>
+        </p:spPr>
+        <p:txBody>
+          <a:bodyPr wrap="square" rtlCol="0">
+            <a:spAutoFit/>
+          </a:bodyPr>
+          <a:lstStyle/>
+          <a:p>
+            <a:r>
+              <a:rPr lang="en-US" sz="1200" b="1" dirty="0"/>
+              <a:t>3</a:t>
+            </a:r>
+            <a:r>
+              <a:rPr lang="en-US" sz="1200" b="1" dirty="0" smtClean="0"/>
+              <a:t> days (Aug 26</a:t>
+            </a:r>
+            <a:r>
+              <a:rPr lang="en-US" sz="1200" b="1" baseline="30000" dirty="0" smtClean="0"/>
+              <a:t>th </a:t>
+            </a:r>
+            <a:r>
+              <a:rPr lang="en-US" sz="1200" b="1" dirty="0" smtClean="0"/>
+              <a:t>to Aug 28</a:t>
+            </a:r>
+            <a:r>
+              <a:rPr lang="en-US" sz="1200" b="1" baseline="30000" dirty="0" smtClean="0"/>
+              <a:t>th</a:t>
+            </a:r>
+            <a:r>
+              <a:rPr lang="en-US" sz="1200" b="1" dirty="0" smtClean="0"/>
+              <a:t>)</a:t>
+            </a:r>
+            <a:endParaRPr lang="en-US" sz="1200" b="1" dirty="0"/>
+          </a:p>
+        </p:txBody>
+      </p:sp>
+      <p:sp>
+        <p:nvSpPr>
+          <p:cNvPr id="37" name="Oval 36"/>
+          <p:cNvSpPr/>
+          <p:nvPr/>
+        </p:nvSpPr>
+        <p:spPr>
+          <a:xfrm>
+            <a:off x="855985" y="3400907"/>
+            <a:ext cx="1465009" cy="1259921"/>
+          </a:xfrm>
+          <a:prstGeom prst="ellipse">
+            <a:avLst/>
+          </a:prstGeom>
+          <a:solidFill>
+            <a:schemeClr val="accent5">
+              <a:lumMod val="20000"/>
+              <a:lumOff val="80000"/>
+            </a:schemeClr>
+          </a:solidFill>
+        </p:spPr>
+        <p:style>
+          <a:lnRef idx="2">
+            <a:schemeClr val="accent1">
+              <a:shade val="50000"/>
+            </a:schemeClr>
+          </a:lnRef>
+          <a:fillRef idx="1">
+            <a:schemeClr val="accent1"/>
+          </a:fillRef>
+          <a:effectRef idx="0">
+            <a:schemeClr val="accent1"/>
+          </a:effectRef>
+          <a:fontRef idx="minor">
+            <a:schemeClr val="lt1"/>
+          </a:fontRef>
+        </p:style>
+        <p:txBody>
+          <a:bodyPr rtlCol="0" anchor="ctr"/>
+          <a:lstStyle/>
+          <a:p>
+            <a:pPr algn="ctr"/>
+            <a:r>
+              <a:rPr lang="en-US" sz="1200" dirty="0" smtClean="0">
+                <a:solidFill>
+                  <a:schemeClr val="tx1"/>
+                </a:solidFill>
+              </a:rPr>
+              <a:t>Selenium</a:t>
+            </a:r>
+          </a:p>
+          <a:p>
+            <a:pPr algn="ctr"/>
+            <a:r>
+              <a:rPr lang="en-US" sz="1200" dirty="0" smtClean="0">
+                <a:solidFill>
+                  <a:schemeClr val="tx1"/>
+                </a:solidFill>
+              </a:rPr>
+              <a:t>Siesta</a:t>
+            </a:r>
+          </a:p>
+          <a:p>
+            <a:pPr algn="ctr"/>
+            <a:r>
+              <a:rPr lang="en-US" sz="1200" dirty="0" smtClean="0">
+                <a:solidFill>
+                  <a:schemeClr val="tx1"/>
+                </a:solidFill>
+              </a:rPr>
+              <a:t>Karma</a:t>
+            </a:r>
+          </a:p>
+        </p:txBody>
+      </p:sp>
+      <p:sp>
+        <p:nvSpPr>
+          <p:cNvPr id="39" name="TextBox 38"/>
+          <p:cNvSpPr txBox="1"/>
+          <p:nvPr/>
+        </p:nvSpPr>
+        <p:spPr>
+          <a:xfrm>
+            <a:off x="3042631" y="3154564"/>
+            <a:ext cx="1986067" cy="276999"/>
+          </a:xfrm>
+          <a:prstGeom prst="rect">
+            <a:avLst/>
+          </a:prstGeom>
+          <a:noFill/>
+        </p:spPr>
+        <p:txBody>
+          <a:bodyPr wrap="square" rtlCol="0">
+            <a:spAutoFit/>
+          </a:bodyPr>
+          <a:lstStyle/>
+          <a:p>
+            <a:r>
+              <a:rPr lang="en-US" sz="1200" b="1" dirty="0" smtClean="0"/>
+              <a:t>5 days (Aug 19</a:t>
+            </a:r>
+            <a:r>
+              <a:rPr lang="en-US" sz="1200" b="1" baseline="30000" dirty="0" smtClean="0"/>
+              <a:t>th</a:t>
+            </a:r>
+            <a:r>
+              <a:rPr lang="en-US" sz="1200" b="1" dirty="0" smtClean="0"/>
+              <a:t> to Aug 23</a:t>
+            </a:r>
+            <a:r>
+              <a:rPr lang="en-US" sz="1200" b="1" baseline="30000" dirty="0" smtClean="0"/>
+              <a:t>rd</a:t>
+            </a:r>
+            <a:r>
+              <a:rPr lang="en-US" sz="1200" b="1" dirty="0" smtClean="0"/>
+              <a:t>)</a:t>
+            </a:r>
+            <a:endParaRPr lang="en-US" sz="1200" b="1" dirty="0"/>
+          </a:p>
+        </p:txBody>
+      </p:sp>
+      <p:sp>
+        <p:nvSpPr>
+          <p:cNvPr id="41" name="Oval 40"/>
+          <p:cNvSpPr/>
+          <p:nvPr/>
+        </p:nvSpPr>
+        <p:spPr>
+          <a:xfrm>
+            <a:off x="5624308" y="3439836"/>
+            <a:ext cx="1465009" cy="1259921"/>
+          </a:xfrm>
+          <a:prstGeom prst="ellipse">
+            <a:avLst/>
+          </a:prstGeom>
+          <a:solidFill>
+            <a:schemeClr val="accent5">
+              <a:lumMod val="20000"/>
+              <a:lumOff val="80000"/>
+            </a:schemeClr>
+          </a:solidFill>
+        </p:spPr>
+        <p:style>
+          <a:lnRef idx="2">
+            <a:schemeClr val="accent1">
+              <a:shade val="50000"/>
+            </a:schemeClr>
+          </a:lnRef>
+          <a:fillRef idx="1">
+            <a:schemeClr val="accent1"/>
+          </a:fillRef>
+          <a:effectRef idx="0">
+            <a:schemeClr val="accent1"/>
+          </a:effectRef>
+          <a:fontRef idx="minor">
+            <a:schemeClr val="lt1"/>
+          </a:fontRef>
+        </p:style>
+        <p:txBody>
+          <a:bodyPr rtlCol="0" anchor="ctr"/>
+          <a:lstStyle/>
+          <a:p>
+            <a:pPr algn="ctr"/>
+            <a:r>
+              <a:rPr lang="en-US" sz="1200" dirty="0" smtClean="0">
+                <a:solidFill>
+                  <a:schemeClr val="tx1"/>
+                </a:solidFill>
+              </a:rPr>
+              <a:t>Spring MVC</a:t>
+            </a:r>
+          </a:p>
+          <a:p>
+            <a:pPr algn="ctr"/>
+            <a:r>
+              <a:rPr lang="en-US" sz="1200" dirty="0" smtClean="0">
+                <a:solidFill>
+                  <a:schemeClr val="tx1"/>
+                </a:solidFill>
+              </a:rPr>
+              <a:t>Hibernate</a:t>
+            </a:r>
+          </a:p>
+          <a:p>
+            <a:pPr algn="ctr"/>
+            <a:r>
+              <a:rPr lang="en-US" sz="1200" dirty="0" err="1" smtClean="0">
+                <a:solidFill>
+                  <a:schemeClr val="tx1"/>
+                </a:solidFill>
+              </a:rPr>
+              <a:t>RabbitMQ</a:t>
+            </a:r>
+            <a:endParaRPr lang="en-US" sz="1200" dirty="0" smtClean="0">
+              <a:solidFill>
+                <a:schemeClr val="tx1"/>
+              </a:solidFill>
+            </a:endParaRPr>
+          </a:p>
+        </p:txBody>
+      </p:sp>
+      <p:cxnSp>
+        <p:nvCxnSpPr>
+          <p:cNvPr id="42" name="Straight Arrow Connector 41"/>
+          <p:cNvCxnSpPr/>
+          <p:nvPr/>
+        </p:nvCxnSpPr>
+        <p:spPr>
+          <a:xfrm flipH="1">
+            <a:off x="7282680" y="3945741"/>
+            <a:ext cx="517238" cy="4173"/>
+          </a:xfrm>
+          <a:prstGeom prst="straightConnector1">
+            <a:avLst/>
+          </a:prstGeom>
+          <a:ln>
+            <a:tailEnd type="triangle"/>
+          </a:ln>
+        </p:spPr>
+        <p:style>
+          <a:lnRef idx="1">
+            <a:schemeClr val="accent1"/>
+          </a:lnRef>
+          <a:fillRef idx="0">
+            <a:schemeClr val="accent1"/>
+          </a:fillRef>
+          <a:effectRef idx="0">
+            <a:schemeClr val="accent1"/>
+          </a:effectRef>
+          <a:fontRef idx="minor">
+            <a:schemeClr val="tx1"/>
+          </a:fontRef>
+        </p:style>
+      </p:cxnSp>
+      <p:sp>
+        <p:nvSpPr>
+          <p:cNvPr id="43" name="TextBox 42"/>
+          <p:cNvSpPr txBox="1"/>
+          <p:nvPr/>
+        </p:nvSpPr>
+        <p:spPr>
+          <a:xfrm>
+            <a:off x="5411057" y="3123908"/>
+            <a:ext cx="2054496" cy="276999"/>
+          </a:xfrm>
+          <a:prstGeom prst="rect">
+            <a:avLst/>
+          </a:prstGeom>
+          <a:noFill/>
+        </p:spPr>
+        <p:txBody>
+          <a:bodyPr wrap="square" rtlCol="0">
+            <a:spAutoFit/>
+          </a:bodyPr>
+          <a:lstStyle/>
+          <a:p>
+            <a:r>
+              <a:rPr lang="en-US" sz="1200" b="1" dirty="0"/>
+              <a:t>5</a:t>
+            </a:r>
+            <a:r>
+              <a:rPr lang="en-US" sz="1200" b="1" dirty="0" smtClean="0"/>
+              <a:t> days (Aug 12</a:t>
+            </a:r>
+            <a:r>
+              <a:rPr lang="en-US" sz="1200" b="1" baseline="30000" dirty="0" smtClean="0"/>
+              <a:t>th</a:t>
+            </a:r>
+            <a:r>
+              <a:rPr lang="en-US" sz="1200" b="1" dirty="0" smtClean="0"/>
+              <a:t> to Aug 16</a:t>
+            </a:r>
+            <a:r>
+              <a:rPr lang="en-US" sz="1200" b="1" baseline="30000" dirty="0" smtClean="0"/>
+              <a:t>th</a:t>
+            </a:r>
+            <a:r>
+              <a:rPr lang="en-US" sz="1200" b="1" dirty="0" smtClean="0"/>
+              <a:t>)</a:t>
+            </a:r>
+            <a:endParaRPr lang="en-US" sz="1200" b="1" dirty="0"/>
+          </a:p>
+        </p:txBody>
+      </p:sp>
+      <p:cxnSp>
+        <p:nvCxnSpPr>
+          <p:cNvPr id="59" name="Straight Arrow Connector 58"/>
+          <p:cNvCxnSpPr/>
+          <p:nvPr/>
+        </p:nvCxnSpPr>
+        <p:spPr>
+          <a:xfrm flipH="1">
+            <a:off x="9616431" y="3958049"/>
+            <a:ext cx="517238" cy="4173"/>
+          </a:xfrm>
+          <a:prstGeom prst="straightConnector1">
+            <a:avLst/>
+          </a:prstGeom>
+          <a:ln>
+            <a:tailEnd type="triangle"/>
+          </a:ln>
+        </p:spPr>
+        <p:style>
+          <a:lnRef idx="1">
+            <a:schemeClr val="accent1"/>
+          </a:lnRef>
+          <a:fillRef idx="0">
+            <a:schemeClr val="accent1"/>
+          </a:fillRef>
+          <a:effectRef idx="0">
+            <a:schemeClr val="accent1"/>
+          </a:effectRef>
+          <a:fontRef idx="minor">
+            <a:schemeClr val="tx1"/>
+          </a:fontRef>
+        </p:style>
+      </p:cxnSp>
+      <p:sp>
+        <p:nvSpPr>
+          <p:cNvPr id="61" name="TextBox 60"/>
+          <p:cNvSpPr txBox="1"/>
+          <p:nvPr/>
+        </p:nvSpPr>
+        <p:spPr>
+          <a:xfrm>
+            <a:off x="680606" y="2280468"/>
+            <a:ext cx="1920081" cy="461665"/>
+          </a:xfrm>
+          <a:prstGeom prst="rect">
+            <a:avLst/>
+          </a:prstGeom>
+          <a:noFill/>
+        </p:spPr>
+        <p:txBody>
+          <a:bodyPr wrap="square" rtlCol="0">
+            <a:spAutoFit/>
+          </a:bodyPr>
+          <a:lstStyle/>
+          <a:p>
+            <a:pPr algn="ctr"/>
+            <a:r>
+              <a:rPr lang="en-US" sz="1200" dirty="0" smtClean="0"/>
+              <a:t>Rich</a:t>
+            </a:r>
+          </a:p>
+          <a:p>
+            <a:pPr algn="ctr"/>
+            <a:r>
+              <a:rPr lang="en-US" sz="1200" dirty="0" smtClean="0"/>
+              <a:t>2 Days of Soft Skills, etc.</a:t>
+            </a:r>
+            <a:endParaRPr lang="en-US" sz="1200" dirty="0"/>
+          </a:p>
+        </p:txBody>
+      </p:sp>
+      <p:sp>
+        <p:nvSpPr>
+          <p:cNvPr id="62" name="TextBox 61"/>
+          <p:cNvSpPr txBox="1"/>
+          <p:nvPr/>
+        </p:nvSpPr>
+        <p:spPr>
+          <a:xfrm>
+            <a:off x="749216" y="697654"/>
+            <a:ext cx="629816" cy="276999"/>
+          </a:xfrm>
+          <a:prstGeom prst="rect">
+            <a:avLst/>
+          </a:prstGeom>
+          <a:noFill/>
+        </p:spPr>
+        <p:txBody>
+          <a:bodyPr wrap="square" rtlCol="0">
+            <a:spAutoFit/>
+          </a:bodyPr>
+          <a:lstStyle/>
+          <a:p>
+            <a:r>
+              <a:rPr lang="en-US" sz="1200" b="1" dirty="0" smtClean="0"/>
+              <a:t>2 days</a:t>
+            </a:r>
+            <a:endParaRPr lang="en-US" sz="1200" b="1" dirty="0"/>
+          </a:p>
+        </p:txBody>
+      </p:sp>
+      <p:sp>
+        <p:nvSpPr>
+          <p:cNvPr id="63" name="Oval 62"/>
+          <p:cNvSpPr/>
+          <p:nvPr/>
+        </p:nvSpPr>
+        <p:spPr>
+          <a:xfrm>
+            <a:off x="3312363" y="3439835"/>
+            <a:ext cx="1465009" cy="1259921"/>
+          </a:xfrm>
+          <a:prstGeom prst="ellipse">
+            <a:avLst/>
+          </a:prstGeom>
+          <a:solidFill>
+            <a:schemeClr val="accent5">
+              <a:lumMod val="20000"/>
+              <a:lumOff val="80000"/>
+            </a:schemeClr>
+          </a:solidFill>
+        </p:spPr>
+        <p:style>
+          <a:lnRef idx="2">
+            <a:schemeClr val="accent1">
+              <a:shade val="50000"/>
+            </a:schemeClr>
+          </a:lnRef>
+          <a:fillRef idx="1">
+            <a:schemeClr val="accent1"/>
+          </a:fillRef>
+          <a:effectRef idx="0">
+            <a:schemeClr val="accent1"/>
+          </a:effectRef>
+          <a:fontRef idx="minor">
+            <a:schemeClr val="lt1"/>
+          </a:fontRef>
+        </p:style>
+        <p:txBody>
+          <a:bodyPr rtlCol="0" anchor="ctr"/>
+          <a:lstStyle/>
+          <a:p>
+            <a:pPr algn="ctr"/>
+            <a:r>
+              <a:rPr lang="en-US" sz="1200" dirty="0" err="1">
+                <a:solidFill>
+                  <a:schemeClr val="tx1"/>
+                </a:solidFill>
+              </a:rPr>
+              <a:t>BootStrap</a:t>
+            </a:r>
+            <a:endParaRPr lang="en-US" sz="1200" dirty="0">
+              <a:solidFill>
+                <a:schemeClr val="tx1"/>
+              </a:solidFill>
+            </a:endParaRPr>
+          </a:p>
+          <a:p>
+            <a:pPr algn="ctr"/>
+            <a:r>
+              <a:rPr lang="en-US" sz="1200" dirty="0" smtClean="0">
+                <a:solidFill>
+                  <a:schemeClr val="tx1"/>
+                </a:solidFill>
+              </a:rPr>
+              <a:t>Angular </a:t>
+            </a:r>
+            <a:r>
+              <a:rPr lang="en-US" sz="1200" dirty="0">
+                <a:solidFill>
+                  <a:schemeClr val="tx1"/>
+                </a:solidFill>
+              </a:rPr>
+              <a:t>(</a:t>
+            </a:r>
+            <a:r>
+              <a:rPr lang="en-US" sz="1200" dirty="0" err="1">
+                <a:solidFill>
+                  <a:schemeClr val="tx1"/>
+                </a:solidFill>
+              </a:rPr>
+              <a:t>TypeScript</a:t>
+            </a:r>
+            <a:r>
+              <a:rPr lang="en-US" sz="1200" dirty="0">
+                <a:solidFill>
+                  <a:schemeClr val="tx1"/>
+                </a:solidFill>
+              </a:rPr>
+              <a:t>)</a:t>
+            </a:r>
+          </a:p>
+          <a:p>
+            <a:pPr algn="ctr"/>
+            <a:r>
+              <a:rPr lang="en-US" sz="1200" dirty="0">
+                <a:solidFill>
+                  <a:schemeClr val="tx1"/>
+                </a:solidFill>
+              </a:rPr>
+              <a:t>React JS</a:t>
+            </a:r>
+          </a:p>
+          <a:p>
+            <a:pPr marL="0" lvl="1" algn="ctr"/>
+            <a:r>
+              <a:rPr lang="en-US" sz="1200" dirty="0">
+                <a:solidFill>
+                  <a:schemeClr val="tx1"/>
+                </a:solidFill>
+              </a:rPr>
+              <a:t>ES5/ES6+</a:t>
+            </a:r>
+          </a:p>
+          <a:p>
+            <a:pPr marL="0" lvl="1" algn="ctr"/>
+            <a:r>
+              <a:rPr lang="en-US" sz="1200" dirty="0" err="1">
+                <a:solidFill>
+                  <a:schemeClr val="tx1"/>
+                </a:solidFill>
+              </a:rPr>
+              <a:t>Transpilers</a:t>
+            </a:r>
+            <a:endParaRPr lang="en-US" sz="1200" dirty="0">
+              <a:solidFill>
+                <a:schemeClr val="tx1"/>
+              </a:solidFill>
+            </a:endParaRPr>
+          </a:p>
+        </p:txBody>
+      </p:sp>
+      <p:cxnSp>
+        <p:nvCxnSpPr>
+          <p:cNvPr id="64" name="Straight Arrow Connector 63"/>
+          <p:cNvCxnSpPr/>
+          <p:nvPr/>
+        </p:nvCxnSpPr>
+        <p:spPr>
+          <a:xfrm flipH="1">
+            <a:off x="2472375" y="3972635"/>
+            <a:ext cx="517238" cy="4173"/>
+          </a:xfrm>
+          <a:prstGeom prst="straightConnector1">
+            <a:avLst/>
+          </a:prstGeom>
+          <a:ln>
+            <a:tailEnd type="triangle"/>
+          </a:ln>
+        </p:spPr>
+        <p:style>
+          <a:lnRef idx="1">
+            <a:schemeClr val="accent1"/>
+          </a:lnRef>
+          <a:fillRef idx="0">
+            <a:schemeClr val="accent1"/>
+          </a:fillRef>
+          <a:effectRef idx="0">
+            <a:schemeClr val="accent1"/>
+          </a:effectRef>
+          <a:fontRef idx="minor">
+            <a:schemeClr val="tx1"/>
+          </a:fontRef>
+        </p:style>
+      </p:cxnSp>
+      <p:sp>
+        <p:nvSpPr>
+          <p:cNvPr id="65" name="TextBox 64"/>
+          <p:cNvSpPr txBox="1"/>
+          <p:nvPr/>
+        </p:nvSpPr>
+        <p:spPr>
+          <a:xfrm>
+            <a:off x="7771618" y="3123908"/>
+            <a:ext cx="1863646" cy="276999"/>
+          </a:xfrm>
+          <a:prstGeom prst="rect">
+            <a:avLst/>
+          </a:prstGeom>
+          <a:noFill/>
+        </p:spPr>
+        <p:txBody>
+          <a:bodyPr wrap="square" rtlCol="0">
+            <a:spAutoFit/>
+          </a:bodyPr>
+          <a:lstStyle/>
+          <a:p>
+            <a:r>
+              <a:rPr lang="en-US" sz="1200" b="1" dirty="0" smtClean="0"/>
+              <a:t>5 days (Aug 5</a:t>
+            </a:r>
+            <a:r>
+              <a:rPr lang="en-US" sz="1200" b="1" baseline="30000" dirty="0" smtClean="0"/>
+              <a:t>th</a:t>
+            </a:r>
+            <a:r>
+              <a:rPr lang="en-US" sz="1200" b="1" dirty="0" smtClean="0"/>
+              <a:t> to Aug 9</a:t>
+            </a:r>
+            <a:r>
+              <a:rPr lang="en-US" sz="1200" b="1" baseline="30000" dirty="0" smtClean="0"/>
+              <a:t>th</a:t>
+            </a:r>
+            <a:r>
+              <a:rPr lang="en-US" sz="1200" b="1" dirty="0" smtClean="0"/>
+              <a:t>)</a:t>
+            </a:r>
+            <a:endParaRPr lang="en-US" sz="1200" b="1" dirty="0"/>
+          </a:p>
+        </p:txBody>
+      </p:sp>
+      <p:cxnSp>
+        <p:nvCxnSpPr>
+          <p:cNvPr id="66" name="Straight Arrow Connector 65"/>
+          <p:cNvCxnSpPr/>
+          <p:nvPr/>
+        </p:nvCxnSpPr>
+        <p:spPr>
+          <a:xfrm>
+            <a:off x="1588488" y="4699756"/>
+            <a:ext cx="1" cy="497808"/>
+          </a:xfrm>
+          <a:prstGeom prst="straightConnector1">
+            <a:avLst/>
+          </a:prstGeom>
+          <a:ln>
+            <a:tailEnd type="triangle"/>
+          </a:ln>
+        </p:spPr>
+        <p:style>
+          <a:lnRef idx="1">
+            <a:schemeClr val="accent1"/>
+          </a:lnRef>
+          <a:fillRef idx="0">
+            <a:schemeClr val="accent1"/>
+          </a:fillRef>
+          <a:effectRef idx="0">
+            <a:schemeClr val="accent1"/>
+          </a:effectRef>
+          <a:fontRef idx="minor">
+            <a:schemeClr val="tx1"/>
+          </a:fontRef>
+        </p:style>
+      </p:cxnSp>
+      <p:sp>
+        <p:nvSpPr>
+          <p:cNvPr id="67" name="Oval 66"/>
+          <p:cNvSpPr/>
+          <p:nvPr/>
+        </p:nvSpPr>
+        <p:spPr>
+          <a:xfrm>
+            <a:off x="844515" y="5390578"/>
+            <a:ext cx="1465009" cy="1259921"/>
+          </a:xfrm>
+          <a:prstGeom prst="ellipse">
+            <a:avLst/>
+          </a:prstGeom>
+          <a:solidFill>
+            <a:schemeClr val="accent5">
+              <a:lumMod val="20000"/>
+              <a:lumOff val="80000"/>
+            </a:schemeClr>
+          </a:solidFill>
+        </p:spPr>
+        <p:style>
+          <a:lnRef idx="2">
+            <a:schemeClr val="accent1">
+              <a:shade val="50000"/>
+            </a:schemeClr>
+          </a:lnRef>
+          <a:fillRef idx="1">
+            <a:schemeClr val="accent1"/>
+          </a:fillRef>
+          <a:effectRef idx="0">
+            <a:schemeClr val="accent1"/>
+          </a:effectRef>
+          <a:fontRef idx="minor">
+            <a:schemeClr val="lt1"/>
+          </a:fontRef>
+        </p:style>
+        <p:txBody>
+          <a:bodyPr rtlCol="0" anchor="ctr"/>
+          <a:lstStyle/>
+          <a:p>
+            <a:pPr algn="ctr"/>
+            <a:r>
+              <a:rPr lang="en-US" sz="1200">
+                <a:solidFill>
+                  <a:schemeClr val="tx1"/>
+                </a:solidFill>
+              </a:rPr>
+              <a:t>Jenkins</a:t>
+            </a:r>
+          </a:p>
+          <a:p>
+            <a:pPr algn="ctr"/>
+            <a:r>
+              <a:rPr lang="en-US" sz="1200">
+                <a:solidFill>
+                  <a:schemeClr val="tx1"/>
+                </a:solidFill>
+              </a:rPr>
+              <a:t>Docker</a:t>
+            </a:r>
+          </a:p>
+          <a:p>
+            <a:pPr algn="ctr"/>
+            <a:r>
+              <a:rPr lang="en-US" sz="1200">
+                <a:solidFill>
+                  <a:schemeClr val="tx1"/>
+                </a:solidFill>
+              </a:rPr>
+              <a:t>Kubernetes</a:t>
+            </a:r>
+            <a:endParaRPr lang="en-US" sz="1200" dirty="0">
+              <a:solidFill>
+                <a:schemeClr val="tx1"/>
+              </a:solidFill>
+            </a:endParaRPr>
+          </a:p>
+        </p:txBody>
+      </p:sp>
+      <p:cxnSp>
+        <p:nvCxnSpPr>
+          <p:cNvPr id="68" name="Straight Arrow Connector 67"/>
+          <p:cNvCxnSpPr/>
+          <p:nvPr/>
+        </p:nvCxnSpPr>
+        <p:spPr>
+          <a:xfrm>
+            <a:off x="2450577" y="5993010"/>
+            <a:ext cx="536931" cy="1"/>
+          </a:xfrm>
+          <a:prstGeom prst="straightConnector1">
+            <a:avLst/>
+          </a:prstGeom>
+          <a:ln>
+            <a:tailEnd type="triangle"/>
+          </a:ln>
+        </p:spPr>
+        <p:style>
+          <a:lnRef idx="1">
+            <a:schemeClr val="accent1"/>
+          </a:lnRef>
+          <a:fillRef idx="0">
+            <a:schemeClr val="accent1"/>
+          </a:fillRef>
+          <a:effectRef idx="0">
+            <a:schemeClr val="accent1"/>
+          </a:effectRef>
+          <a:fontRef idx="minor">
+            <a:schemeClr val="tx1"/>
+          </a:fontRef>
+        </p:style>
+      </p:cxnSp>
+      <p:sp>
+        <p:nvSpPr>
+          <p:cNvPr id="69" name="TextBox 68"/>
+          <p:cNvSpPr txBox="1"/>
+          <p:nvPr/>
+        </p:nvSpPr>
+        <p:spPr>
+          <a:xfrm>
+            <a:off x="656104" y="5164749"/>
+            <a:ext cx="2062938" cy="276999"/>
+          </a:xfrm>
+          <a:prstGeom prst="rect">
+            <a:avLst/>
+          </a:prstGeom>
+          <a:noFill/>
+        </p:spPr>
+        <p:txBody>
+          <a:bodyPr wrap="square" rtlCol="0">
+            <a:spAutoFit/>
+          </a:bodyPr>
+          <a:lstStyle/>
+          <a:p>
+            <a:r>
+              <a:rPr lang="en-US" sz="1200" b="1" dirty="0"/>
+              <a:t>2</a:t>
+            </a:r>
+            <a:r>
+              <a:rPr lang="en-US" sz="1200" b="1" dirty="0" smtClean="0"/>
+              <a:t> days (Aug 29</a:t>
+            </a:r>
+            <a:r>
+              <a:rPr lang="en-US" sz="1200" b="1" baseline="30000" dirty="0" smtClean="0"/>
+              <a:t>th</a:t>
+            </a:r>
+            <a:r>
+              <a:rPr lang="en-US" sz="1200" b="1" dirty="0" smtClean="0"/>
+              <a:t> to Aug 30</a:t>
+            </a:r>
+            <a:r>
+              <a:rPr lang="en-US" sz="1200" b="1" baseline="30000" dirty="0" smtClean="0"/>
+              <a:t>th</a:t>
+            </a:r>
+            <a:r>
+              <a:rPr lang="en-US" sz="1200" b="1" dirty="0" smtClean="0"/>
+              <a:t>)</a:t>
+            </a:r>
+            <a:endParaRPr lang="en-US" sz="1200" b="1" dirty="0"/>
+          </a:p>
+        </p:txBody>
+      </p:sp>
+      <p:sp>
+        <p:nvSpPr>
+          <p:cNvPr id="71" name="Oval 70"/>
+          <p:cNvSpPr/>
+          <p:nvPr/>
+        </p:nvSpPr>
+        <p:spPr>
+          <a:xfrm>
+            <a:off x="3265558" y="5413679"/>
+            <a:ext cx="1465009" cy="1259921"/>
+          </a:xfrm>
+          <a:prstGeom prst="ellipse">
+            <a:avLst/>
+          </a:prstGeom>
+          <a:solidFill>
+            <a:schemeClr val="accent5">
+              <a:lumMod val="20000"/>
+              <a:lumOff val="80000"/>
+            </a:schemeClr>
+          </a:solidFill>
+        </p:spPr>
+        <p:style>
+          <a:lnRef idx="2">
+            <a:schemeClr val="accent1">
+              <a:shade val="50000"/>
+            </a:schemeClr>
+          </a:lnRef>
+          <a:fillRef idx="1">
+            <a:schemeClr val="accent1"/>
+          </a:fillRef>
+          <a:effectRef idx="0">
+            <a:schemeClr val="accent1"/>
+          </a:effectRef>
+          <a:fontRef idx="minor">
+            <a:schemeClr val="lt1"/>
+          </a:fontRef>
+        </p:style>
+        <p:txBody>
+          <a:bodyPr rtlCol="0" anchor="ctr"/>
+          <a:lstStyle/>
+          <a:p>
+            <a:pPr algn="ctr"/>
+            <a:r>
+              <a:rPr lang="en-US" sz="1200">
+                <a:solidFill>
+                  <a:schemeClr val="tx1"/>
+                </a:solidFill>
+              </a:rPr>
+              <a:t>Final Project</a:t>
+            </a:r>
+            <a:endParaRPr lang="en-US" sz="1200" dirty="0">
+              <a:solidFill>
+                <a:schemeClr val="tx1"/>
+              </a:solidFill>
+            </a:endParaRPr>
+          </a:p>
+        </p:txBody>
+      </p:sp>
+      <p:cxnSp>
+        <p:nvCxnSpPr>
+          <p:cNvPr id="72" name="Straight Arrow Connector 71"/>
+          <p:cNvCxnSpPr/>
+          <p:nvPr/>
+        </p:nvCxnSpPr>
+        <p:spPr>
+          <a:xfrm>
+            <a:off x="4862043" y="5971203"/>
+            <a:ext cx="536931" cy="1"/>
+          </a:xfrm>
+          <a:prstGeom prst="straightConnector1">
+            <a:avLst/>
+          </a:prstGeom>
+          <a:ln>
+            <a:tailEnd type="triangle"/>
+          </a:ln>
+        </p:spPr>
+        <p:style>
+          <a:lnRef idx="1">
+            <a:schemeClr val="accent1"/>
+          </a:lnRef>
+          <a:fillRef idx="0">
+            <a:schemeClr val="accent1"/>
+          </a:fillRef>
+          <a:effectRef idx="0">
+            <a:schemeClr val="accent1"/>
+          </a:effectRef>
+          <a:fontRef idx="minor">
+            <a:schemeClr val="tx1"/>
+          </a:fontRef>
+        </p:style>
+      </p:cxnSp>
+      <p:sp>
+        <p:nvSpPr>
+          <p:cNvPr id="73" name="TextBox 72"/>
+          <p:cNvSpPr txBox="1"/>
+          <p:nvPr/>
+        </p:nvSpPr>
+        <p:spPr>
+          <a:xfrm>
+            <a:off x="3067569" y="5175155"/>
+            <a:ext cx="1986067" cy="276999"/>
+          </a:xfrm>
+          <a:prstGeom prst="rect">
+            <a:avLst/>
+          </a:prstGeom>
+          <a:noFill/>
+        </p:spPr>
+        <p:txBody>
+          <a:bodyPr wrap="square" rtlCol="0">
+            <a:spAutoFit/>
+          </a:bodyPr>
+          <a:lstStyle/>
+          <a:p>
+            <a:r>
+              <a:rPr lang="en-US" sz="1200" b="1" dirty="0"/>
+              <a:t>5</a:t>
+            </a:r>
+            <a:r>
+              <a:rPr lang="en-US" sz="1200" b="1" dirty="0" smtClean="0"/>
+              <a:t> </a:t>
+            </a:r>
+            <a:r>
+              <a:rPr lang="en-US" sz="1200" b="1" dirty="0" smtClean="0"/>
+              <a:t>days (Sept 2</a:t>
+            </a:r>
+            <a:r>
+              <a:rPr lang="en-US" sz="1200" b="1" baseline="30000" dirty="0" smtClean="0"/>
+              <a:t>nd</a:t>
+            </a:r>
+            <a:r>
+              <a:rPr lang="en-US" sz="1200" b="1" dirty="0" smtClean="0"/>
+              <a:t> to Sept 6</a:t>
+            </a:r>
+            <a:r>
+              <a:rPr lang="en-US" sz="1200" b="1" baseline="30000" dirty="0" smtClean="0"/>
+              <a:t>th</a:t>
+            </a:r>
+            <a:r>
+              <a:rPr lang="en-US" sz="1200" b="1" dirty="0" smtClean="0"/>
+              <a:t>)</a:t>
+            </a:r>
+            <a:endParaRPr lang="en-US" sz="1200" b="1" dirty="0"/>
+          </a:p>
+        </p:txBody>
+      </p:sp>
+      <p:sp>
+        <p:nvSpPr>
+          <p:cNvPr id="79" name="Oval 78"/>
+          <p:cNvSpPr/>
+          <p:nvPr/>
+        </p:nvSpPr>
+        <p:spPr>
+          <a:xfrm>
+            <a:off x="5573439" y="5413679"/>
+            <a:ext cx="1465009" cy="1259921"/>
+          </a:xfrm>
+          <a:prstGeom prst="ellipse">
+            <a:avLst/>
+          </a:prstGeom>
+          <a:solidFill>
+            <a:srgbClr val="FF0000"/>
+          </a:solidFill>
+        </p:spPr>
+        <p:style>
+          <a:lnRef idx="2">
+            <a:schemeClr val="accent1">
+              <a:shade val="50000"/>
+            </a:schemeClr>
+          </a:lnRef>
+          <a:fillRef idx="1">
+            <a:schemeClr val="accent1"/>
+          </a:fillRef>
+          <a:effectRef idx="0">
+            <a:schemeClr val="accent1"/>
+          </a:effectRef>
+          <a:fontRef idx="minor">
+            <a:schemeClr val="lt1"/>
+          </a:fontRef>
+        </p:style>
+        <p:txBody>
+          <a:bodyPr rtlCol="0" anchor="ctr"/>
+          <a:lstStyle/>
+          <a:p>
+            <a:pPr algn="ctr"/>
+            <a:r>
+              <a:rPr lang="en-US" sz="2000" b="1" dirty="0" smtClean="0">
+                <a:solidFill>
+                  <a:schemeClr val="bg1"/>
+                </a:solidFill>
+              </a:rPr>
+              <a:t>End</a:t>
+            </a:r>
+            <a:endParaRPr lang="en-US" sz="2000" b="1" dirty="0">
+              <a:solidFill>
+                <a:schemeClr val="bg1"/>
+              </a:solidFill>
+            </a:endParaRPr>
+          </a:p>
+        </p:txBody>
+      </p:sp>
+      <p:sp>
+        <p:nvSpPr>
+          <p:cNvPr id="49" name="Oval 48"/>
+          <p:cNvSpPr/>
+          <p:nvPr/>
+        </p:nvSpPr>
+        <p:spPr>
+          <a:xfrm>
+            <a:off x="7953200" y="3383394"/>
+            <a:ext cx="1465009" cy="1259921"/>
+          </a:xfrm>
+          <a:prstGeom prst="ellipse">
+            <a:avLst/>
+          </a:prstGeom>
+          <a:solidFill>
+            <a:schemeClr val="accent5">
+              <a:lumMod val="20000"/>
+              <a:lumOff val="80000"/>
+            </a:schemeClr>
+          </a:solidFill>
+        </p:spPr>
+        <p:style>
+          <a:lnRef idx="2">
+            <a:schemeClr val="accent1">
+              <a:shade val="50000"/>
+            </a:schemeClr>
+          </a:lnRef>
+          <a:fillRef idx="1">
+            <a:schemeClr val="accent1"/>
+          </a:fillRef>
+          <a:effectRef idx="0">
+            <a:schemeClr val="accent1"/>
+          </a:effectRef>
+          <a:fontRef idx="minor">
+            <a:schemeClr val="lt1"/>
+          </a:fontRef>
+        </p:style>
+        <p:txBody>
+          <a:bodyPr rtlCol="0" anchor="ctr"/>
+          <a:lstStyle/>
+          <a:p>
+            <a:pPr algn="ctr"/>
+            <a:r>
+              <a:rPr lang="en-US" sz="1200" dirty="0" smtClean="0">
+                <a:solidFill>
+                  <a:schemeClr val="tx1"/>
+                </a:solidFill>
+              </a:rPr>
+              <a:t>DBs and NoSQL</a:t>
+            </a:r>
+          </a:p>
+        </p:txBody>
+      </p:sp>
+      <p:sp>
+        <p:nvSpPr>
+          <p:cNvPr id="50" name="TextBox 49"/>
+          <p:cNvSpPr txBox="1"/>
+          <p:nvPr/>
+        </p:nvSpPr>
+        <p:spPr>
+          <a:xfrm>
+            <a:off x="10054032" y="3109985"/>
+            <a:ext cx="1949546" cy="276999"/>
+          </a:xfrm>
+          <a:prstGeom prst="rect">
+            <a:avLst/>
+          </a:prstGeom>
+          <a:noFill/>
+        </p:spPr>
+        <p:txBody>
+          <a:bodyPr wrap="square" rtlCol="0">
+            <a:spAutoFit/>
+          </a:bodyPr>
+          <a:lstStyle/>
+          <a:p>
+            <a:r>
+              <a:rPr lang="en-US" sz="1200" b="1" dirty="0" smtClean="0"/>
+              <a:t>5 days (July 29</a:t>
+            </a:r>
+            <a:r>
+              <a:rPr lang="en-US" sz="1200" b="1" baseline="30000" dirty="0" smtClean="0"/>
+              <a:t>th</a:t>
+            </a:r>
+            <a:r>
+              <a:rPr lang="en-US" sz="1200" b="1" dirty="0" smtClean="0"/>
+              <a:t> to Aug 2</a:t>
+            </a:r>
+            <a:r>
+              <a:rPr lang="en-US" sz="1200" b="1" baseline="30000" dirty="0" smtClean="0"/>
+              <a:t>nd</a:t>
+            </a:r>
+            <a:r>
+              <a:rPr lang="en-US" sz="1200" b="1" dirty="0" smtClean="0"/>
+              <a:t>)</a:t>
+            </a:r>
+            <a:endParaRPr lang="en-US" sz="1200" b="1" dirty="0"/>
+          </a:p>
+        </p:txBody>
+      </p:sp>
+      <p:sp>
+        <p:nvSpPr>
+          <p:cNvPr id="51" name="Oval 50"/>
+          <p:cNvSpPr/>
+          <p:nvPr/>
+        </p:nvSpPr>
+        <p:spPr>
+          <a:xfrm>
+            <a:off x="10247394" y="3368759"/>
+            <a:ext cx="1465009" cy="1259921"/>
+          </a:xfrm>
+          <a:prstGeom prst="ellipse">
+            <a:avLst/>
+          </a:prstGeom>
+          <a:solidFill>
+            <a:schemeClr val="accent5">
+              <a:lumMod val="20000"/>
+              <a:lumOff val="80000"/>
+            </a:schemeClr>
+          </a:solidFill>
+        </p:spPr>
+        <p:style>
+          <a:lnRef idx="2">
+            <a:schemeClr val="accent1">
+              <a:shade val="50000"/>
+            </a:schemeClr>
+          </a:lnRef>
+          <a:fillRef idx="1">
+            <a:schemeClr val="accent1"/>
+          </a:fillRef>
+          <a:effectRef idx="0">
+            <a:schemeClr val="accent1"/>
+          </a:effectRef>
+          <a:fontRef idx="minor">
+            <a:schemeClr val="lt1"/>
+          </a:fontRef>
+        </p:style>
+        <p:txBody>
+          <a:bodyPr rtlCol="0" anchor="ctr"/>
+          <a:lstStyle/>
+          <a:p>
+            <a:pPr algn="ctr"/>
+            <a:r>
+              <a:rPr lang="en-US" sz="1200" dirty="0" smtClean="0">
+                <a:solidFill>
+                  <a:schemeClr val="tx1"/>
+                </a:solidFill>
+              </a:rPr>
+              <a:t>MID TERM (JAVA)</a:t>
+            </a:r>
+            <a:endParaRPr lang="en-US" sz="1200" dirty="0" smtClean="0">
+              <a:solidFill>
+                <a:schemeClr val="tx1"/>
+              </a:solidFill>
+            </a:endParaRPr>
+          </a:p>
+        </p:txBody>
+      </p:sp>
+      <p:cxnSp>
+        <p:nvCxnSpPr>
+          <p:cNvPr id="4" name="Straight Arrow Connector 3"/>
+          <p:cNvCxnSpPr/>
+          <p:nvPr/>
+        </p:nvCxnSpPr>
+        <p:spPr>
+          <a:xfrm>
+            <a:off x="10969506" y="2855592"/>
+            <a:ext cx="10392" cy="306243"/>
+          </a:xfrm>
+          <a:prstGeom prst="straightConnector1">
+            <a:avLst/>
+          </a:prstGeom>
+          <a:ln>
+            <a:tailEnd type="triangle"/>
+          </a:ln>
+        </p:spPr>
+        <p:style>
+          <a:lnRef idx="1">
+            <a:schemeClr val="accent1"/>
+          </a:lnRef>
+          <a:fillRef idx="0">
+            <a:schemeClr val="accent1"/>
+          </a:fillRef>
+          <a:effectRef idx="0">
+            <a:schemeClr val="accent1"/>
+          </a:effectRef>
+          <a:fontRef idx="minor">
+            <a:schemeClr val="tx1"/>
+          </a:fontRef>
+        </p:style>
+      </p:cxnSp>
+      <p:cxnSp>
+        <p:nvCxnSpPr>
+          <p:cNvPr id="70" name="Straight Arrow Connector 69"/>
+          <p:cNvCxnSpPr/>
+          <p:nvPr/>
+        </p:nvCxnSpPr>
+        <p:spPr>
+          <a:xfrm flipH="1">
+            <a:off x="4924480" y="3995274"/>
+            <a:ext cx="517238" cy="4173"/>
+          </a:xfrm>
+          <a:prstGeom prst="straightConnector1">
+            <a:avLst/>
+          </a:prstGeom>
+          <a:ln>
+            <a:tailEnd type="triangle"/>
+          </a:ln>
+        </p:spPr>
+        <p:style>
+          <a:lnRef idx="1">
+            <a:schemeClr val="accent1"/>
+          </a:lnRef>
+          <a:fillRef idx="0">
+            <a:schemeClr val="accent1"/>
+          </a:fillRef>
+          <a:effectRef idx="0">
+            <a:schemeClr val="accent1"/>
+          </a:effectRef>
+          <a:fontRef idx="minor">
+            <a:schemeClr val="tx1"/>
+          </a:fontRef>
+        </p:style>
+      </p:cxnSp>
     </p:spTree>
     <p:extLst>
       <p:ext uri="{BB962C8B-B14F-4D97-AF65-F5344CB8AC3E}">
-        <p14:creationId xmlns:p14="http://schemas.microsoft.com/office/powerpoint/2010/main" val="4184816593"/>
+        <p14:creationId xmlns:p14="http://schemas.microsoft.com/office/powerpoint/2010/main" val="3125399466"/>
       </p:ext>
     </p:extLst>
   </p:cSld>

</xml_diff>